<commit_message>
Mudanças pedidas na apressentação
</commit_message>
<xml_diff>
--- a/Documentação/Documentação Proj.pptx
+++ b/Documentação/Documentação Proj.pptx
@@ -7,8 +7,8 @@
   <p:sldIdLst>
     <p:sldId id="256" r:id="rId2"/>
     <p:sldId id="257" r:id="rId3"/>
-    <p:sldId id="259" r:id="rId4"/>
-    <p:sldId id="261" r:id="rId5"/>
+    <p:sldId id="261" r:id="rId4"/>
+    <p:sldId id="275" r:id="rId5"/>
     <p:sldId id="269" r:id="rId6"/>
     <p:sldId id="263" r:id="rId7"/>
     <p:sldId id="264" r:id="rId8"/>
@@ -123,15 +123,15 @@
 </file>
 
 <file path=ppt/diagrams/colors1.xml><?xml version="1.0" encoding="utf-8"?>
-<dgm:colorsDef xmlns:dgm="http://schemas.openxmlformats.org/drawingml/2006/diagram" xmlns:a="http://schemas.openxmlformats.org/drawingml/2006/main" uniqueId="urn:microsoft.com/office/officeart/2005/8/colors/colorful5">
+<dgm:colorsDef xmlns:dgm="http://schemas.openxmlformats.org/drawingml/2006/diagram" xmlns:a="http://schemas.openxmlformats.org/drawingml/2006/main" uniqueId="urn:microsoft.com/office/officeart/2005/8/colors/accent1_2">
   <dgm:title val=""/>
   <dgm:desc val=""/>
   <dgm:catLst>
-    <dgm:cat type="colorful" pri="10500"/>
+    <dgm:cat type="accent1" pri="11200"/>
   </dgm:catLst>
   <dgm:styleLbl name="node0">
     <dgm:fillClrLst meth="repeat">
-      <a:schemeClr val="accent4"/>
+      <a:schemeClr val="accent1"/>
     </dgm:fillClrLst>
     <dgm:linClrLst meth="repeat">
       <a:schemeClr val="lt1"/>
@@ -141,10 +141,21 @@
     <dgm:txFillClrLst/>
     <dgm:txEffectClrLst/>
   </dgm:styleLbl>
+  <dgm:styleLbl name="alignNode1">
+    <dgm:fillClrLst meth="repeat">
+      <a:schemeClr val="accent1"/>
+    </dgm:fillClrLst>
+    <dgm:linClrLst meth="repeat">
+      <a:schemeClr val="accent1"/>
+    </dgm:linClrLst>
+    <dgm:effectClrLst/>
+    <dgm:txLinClrLst/>
+    <dgm:txFillClrLst/>
+    <dgm:txEffectClrLst/>
+  </dgm:styleLbl>
   <dgm:styleLbl name="node1">
-    <dgm:fillClrLst>
-      <a:schemeClr val="accent5"/>
-      <a:schemeClr val="accent6"/>
+    <dgm:fillClrLst meth="repeat">
+      <a:schemeClr val="accent1"/>
     </dgm:fillClrLst>
     <dgm:linClrLst meth="repeat">
       <a:schemeClr val="lt1"/>
@@ -154,24 +165,9 @@
     <dgm:txFillClrLst/>
     <dgm:txEffectClrLst/>
   </dgm:styleLbl>
-  <dgm:styleLbl name="alignNode1">
-    <dgm:fillClrLst>
-      <a:schemeClr val="accent5"/>
-      <a:schemeClr val="accent6"/>
-    </dgm:fillClrLst>
-    <dgm:linClrLst>
-      <a:schemeClr val="accent5"/>
-      <a:schemeClr val="accent6"/>
-    </dgm:linClrLst>
-    <dgm:effectClrLst/>
-    <dgm:txLinClrLst/>
-    <dgm:txFillClrLst/>
-    <dgm:txEffectClrLst/>
-  </dgm:styleLbl>
   <dgm:styleLbl name="lnNode1">
-    <dgm:fillClrLst>
-      <a:schemeClr val="accent5"/>
-      <a:schemeClr val="accent6"/>
+    <dgm:fillClrLst meth="repeat">
+      <a:schemeClr val="accent1"/>
     </dgm:fillClrLst>
     <dgm:linClrLst meth="repeat">
       <a:schemeClr val="lt1"/>
@@ -182,11 +178,8 @@
     <dgm:txEffectClrLst/>
   </dgm:styleLbl>
   <dgm:styleLbl name="vennNode1">
-    <dgm:fillClrLst>
-      <a:schemeClr val="accent5">
-        <a:alpha val="50000"/>
-      </a:schemeClr>
-      <a:schemeClr val="accent6">
+    <dgm:fillClrLst meth="repeat">
+      <a:schemeClr val="accent1">
         <a:alpha val="50000"/>
       </a:schemeClr>
     </dgm:fillClrLst>
@@ -199,19 +192,7 @@
     <dgm:txEffectClrLst/>
   </dgm:styleLbl>
   <dgm:styleLbl name="node2">
-    <dgm:fillClrLst>
-      <a:schemeClr val="accent6"/>
-    </dgm:fillClrLst>
-    <dgm:linClrLst meth="repeat">
-      <a:schemeClr val="lt1"/>
-    </dgm:linClrLst>
-    <dgm:effectClrLst/>
-    <dgm:txLinClrLst/>
-    <dgm:txFillClrLst/>
-    <dgm:txEffectClrLst/>
-  </dgm:styleLbl>
-  <dgm:styleLbl name="node3">
-    <dgm:fillClrLst>
+    <dgm:fillClrLst meth="repeat">
       <a:schemeClr val="accent1"/>
     </dgm:fillClrLst>
     <dgm:linClrLst meth="repeat">
@@ -222,9 +203,9 @@
     <dgm:txFillClrLst/>
     <dgm:txEffectClrLst/>
   </dgm:styleLbl>
-  <dgm:styleLbl name="node4">
-    <dgm:fillClrLst>
-      <a:schemeClr val="accent2"/>
+  <dgm:styleLbl name="node3">
+    <dgm:fillClrLst meth="repeat">
+      <a:schemeClr val="accent1"/>
     </dgm:fillClrLst>
     <dgm:linClrLst meth="repeat">
       <a:schemeClr val="lt1"/>
@@ -234,12 +215,21 @@
     <dgm:txFillClrLst/>
     <dgm:txEffectClrLst/>
   </dgm:styleLbl>
+  <dgm:styleLbl name="node4">
+    <dgm:fillClrLst meth="repeat">
+      <a:schemeClr val="accent1"/>
+    </dgm:fillClrLst>
+    <dgm:linClrLst meth="repeat">
+      <a:schemeClr val="lt1"/>
+    </dgm:linClrLst>
+    <dgm:effectClrLst/>
+    <dgm:txLinClrLst/>
+    <dgm:txFillClrLst/>
+    <dgm:txEffectClrLst/>
+  </dgm:styleLbl>
   <dgm:styleLbl name="fgImgPlace1">
-    <dgm:fillClrLst>
-      <a:schemeClr val="accent5">
-        <a:tint val="50000"/>
-      </a:schemeClr>
-      <a:schemeClr val="accent6">
+    <dgm:fillClrLst meth="repeat">
+      <a:schemeClr val="accent1">
         <a:tint val="50000"/>
       </a:schemeClr>
     </dgm:fillClrLst>
@@ -254,12 +244,9 @@
     <dgm:txEffectClrLst/>
   </dgm:styleLbl>
   <dgm:styleLbl name="alignImgPlace1">
-    <dgm:fillClrLst>
-      <a:schemeClr val="accent5">
+    <dgm:fillClrLst meth="repeat">
+      <a:schemeClr val="accent1">
         <a:tint val="50000"/>
-      </a:schemeClr>
-      <a:schemeClr val="accent6">
-        <a:tint val="20000"/>
       </a:schemeClr>
     </dgm:fillClrLst>
     <dgm:linClrLst meth="repeat">
@@ -273,12 +260,9 @@
     <dgm:txEffectClrLst/>
   </dgm:styleLbl>
   <dgm:styleLbl name="bgImgPlace1">
-    <dgm:fillClrLst>
-      <a:schemeClr val="accent5">
+    <dgm:fillClrLst meth="repeat">
+      <a:schemeClr val="accent1">
         <a:tint val="50000"/>
-      </a:schemeClr>
-      <a:schemeClr val="accent6">
-        <a:tint val="20000"/>
       </a:schemeClr>
     </dgm:fillClrLst>
     <dgm:linClrLst meth="repeat">
@@ -292,84 +276,14 @@
     <dgm:txEffectClrLst/>
   </dgm:styleLbl>
   <dgm:styleLbl name="sibTrans2D1">
-    <dgm:fillClrLst>
-      <a:schemeClr val="accent5"/>
-      <a:schemeClr val="accent6"/>
+    <dgm:fillClrLst meth="repeat">
+      <a:schemeClr val="accent1">
+        <a:tint val="60000"/>
+      </a:schemeClr>
     </dgm:fillClrLst>
     <dgm:linClrLst meth="repeat">
-      <a:schemeClr val="lt1"/>
-    </dgm:linClrLst>
-    <dgm:effectClrLst/>
-    <dgm:txLinClrLst/>
-    <dgm:txFillClrLst/>
-    <dgm:txEffectClrLst/>
-  </dgm:styleLbl>
-  <dgm:styleLbl name="fgSibTrans2D1">
-    <dgm:fillClrLst>
-      <a:schemeClr val="accent5"/>
-      <a:schemeClr val="accent6"/>
-    </dgm:fillClrLst>
-    <dgm:linClrLst meth="repeat">
-      <a:schemeClr val="lt1"/>
-    </dgm:linClrLst>
-    <dgm:effectClrLst/>
-    <dgm:txLinClrLst/>
-    <dgm:txFillClrLst meth="repeat">
-      <a:schemeClr val="lt1"/>
-    </dgm:txFillClrLst>
-    <dgm:txEffectClrLst/>
-  </dgm:styleLbl>
-  <dgm:styleLbl name="bgSibTrans2D1">
-    <dgm:fillClrLst>
-      <a:schemeClr val="accent5"/>
-      <a:schemeClr val="accent6"/>
-    </dgm:fillClrLst>
-    <dgm:linClrLst meth="repeat">
-      <a:schemeClr val="lt1"/>
-    </dgm:linClrLst>
-    <dgm:effectClrLst/>
-    <dgm:txLinClrLst/>
-    <dgm:txFillClrLst meth="repeat">
-      <a:schemeClr val="lt1"/>
-    </dgm:txFillClrLst>
-    <dgm:txEffectClrLst/>
-  </dgm:styleLbl>
-  <dgm:styleLbl name="sibTrans1D1">
-    <dgm:fillClrLst/>
-    <dgm:linClrLst>
-      <a:schemeClr val="accent5"/>
-      <a:schemeClr val="accent6"/>
-    </dgm:linClrLst>
-    <dgm:effectClrLst/>
-    <dgm:txLinClrLst/>
-    <dgm:txFillClrLst meth="repeat">
-      <a:schemeClr val="tx1"/>
-    </dgm:txFillClrLst>
-    <dgm:txEffectClrLst/>
-  </dgm:styleLbl>
-  <dgm:styleLbl name="callout">
-    <dgm:fillClrLst meth="repeat">
-      <a:schemeClr val="accent5"/>
-    </dgm:fillClrLst>
-    <dgm:linClrLst meth="repeat">
-      <a:schemeClr val="accent5">
-        <a:tint val="50000"/>
-      </a:schemeClr>
-    </dgm:linClrLst>
-    <dgm:effectClrLst/>
-    <dgm:txLinClrLst/>
-    <dgm:txFillClrLst meth="repeat">
-      <a:schemeClr val="tx1"/>
-    </dgm:txFillClrLst>
-    <dgm:txEffectClrLst/>
-  </dgm:styleLbl>
-  <dgm:styleLbl name="asst0">
-    <dgm:fillClrLst meth="repeat">
-      <a:schemeClr val="accent5"/>
-    </dgm:fillClrLst>
-    <dgm:linClrLst meth="repeat">
-      <a:schemeClr val="lt1">
-        <a:shade val="80000"/>
+      <a:schemeClr val="accent1">
+        <a:tint val="60000"/>
       </a:schemeClr>
     </dgm:linClrLst>
     <dgm:effectClrLst/>
@@ -377,13 +291,15 @@
     <dgm:txFillClrLst/>
     <dgm:txEffectClrLst/>
   </dgm:styleLbl>
-  <dgm:styleLbl name="asst1">
+  <dgm:styleLbl name="fgSibTrans2D1">
     <dgm:fillClrLst meth="repeat">
-      <a:schemeClr val="accent6"/>
+      <a:schemeClr val="accent1">
+        <a:tint val="60000"/>
+      </a:schemeClr>
     </dgm:fillClrLst>
     <dgm:linClrLst meth="repeat">
-      <a:schemeClr val="lt1">
-        <a:shade val="80000"/>
+      <a:schemeClr val="accent1">
+        <a:tint val="60000"/>
       </a:schemeClr>
     </dgm:linClrLst>
     <dgm:effectClrLst/>
@@ -391,129 +307,25 @@
     <dgm:txFillClrLst/>
     <dgm:txEffectClrLst/>
   </dgm:styleLbl>
-  <dgm:styleLbl name="asst2">
-    <dgm:fillClrLst>
-      <a:schemeClr val="accent1"/>
+  <dgm:styleLbl name="bgSibTrans2D1">
+    <dgm:fillClrLst meth="repeat">
+      <a:schemeClr val="accent1">
+        <a:tint val="60000"/>
+      </a:schemeClr>
     </dgm:fillClrLst>
     <dgm:linClrLst meth="repeat">
-      <a:schemeClr val="lt1"/>
+      <a:schemeClr val="accent1">
+        <a:tint val="60000"/>
+      </a:schemeClr>
     </dgm:linClrLst>
     <dgm:effectClrLst/>
     <dgm:txLinClrLst/>
     <dgm:txFillClrLst/>
     <dgm:txEffectClrLst/>
   </dgm:styleLbl>
-  <dgm:styleLbl name="asst3">
-    <dgm:fillClrLst>
-      <a:schemeClr val="accent2"/>
-    </dgm:fillClrLst>
-    <dgm:linClrLst meth="repeat">
-      <a:schemeClr val="lt1"/>
-    </dgm:linClrLst>
-    <dgm:effectClrLst/>
-    <dgm:txLinClrLst/>
-    <dgm:txFillClrLst/>
-    <dgm:txEffectClrLst/>
-  </dgm:styleLbl>
-  <dgm:styleLbl name="asst4">
-    <dgm:fillClrLst>
-      <a:schemeClr val="accent3"/>
-    </dgm:fillClrLst>
-    <dgm:linClrLst meth="repeat">
-      <a:schemeClr val="lt1"/>
-    </dgm:linClrLst>
-    <dgm:effectClrLst/>
-    <dgm:txLinClrLst/>
-    <dgm:txFillClrLst/>
-    <dgm:txEffectClrLst/>
-  </dgm:styleLbl>
-  <dgm:styleLbl name="parChTrans2D1">
-    <dgm:fillClrLst meth="repeat">
-      <a:schemeClr val="accent5"/>
-    </dgm:fillClrLst>
-    <dgm:linClrLst meth="repeat">
-      <a:schemeClr val="lt1"/>
-    </dgm:linClrLst>
-    <dgm:effectClrLst/>
-    <dgm:txLinClrLst/>
-    <dgm:txFillClrLst meth="repeat">
-      <a:schemeClr val="lt1"/>
-    </dgm:txFillClrLst>
-    <dgm:txEffectClrLst/>
-  </dgm:styleLbl>
-  <dgm:styleLbl name="parChTrans2D2">
-    <dgm:fillClrLst meth="repeat">
-      <a:schemeClr val="accent6"/>
-    </dgm:fillClrLst>
-    <dgm:linClrLst meth="repeat">
-      <a:schemeClr val="lt1"/>
-    </dgm:linClrLst>
-    <dgm:effectClrLst/>
-    <dgm:txLinClrLst/>
-    <dgm:txFillClrLst/>
-    <dgm:txEffectClrLst/>
-  </dgm:styleLbl>
-  <dgm:styleLbl name="parChTrans2D3">
-    <dgm:fillClrLst meth="repeat">
-      <a:schemeClr val="accent6"/>
-    </dgm:fillClrLst>
-    <dgm:linClrLst meth="repeat">
-      <a:schemeClr val="lt1"/>
-    </dgm:linClrLst>
-    <dgm:effectClrLst/>
-    <dgm:txLinClrLst/>
-    <dgm:txFillClrLst/>
-    <dgm:txEffectClrLst/>
-  </dgm:styleLbl>
-  <dgm:styleLbl name="parChTrans2D4">
+  <dgm:styleLbl name="sibTrans1D1">
     <dgm:fillClrLst meth="repeat">
       <a:schemeClr val="accent1"/>
-    </dgm:fillClrLst>
-    <dgm:linClrLst meth="repeat">
-      <a:schemeClr val="lt1"/>
-    </dgm:linClrLst>
-    <dgm:effectClrLst/>
-    <dgm:txLinClrLst/>
-    <dgm:txFillClrLst meth="repeat">
-      <a:schemeClr val="lt1"/>
-    </dgm:txFillClrLst>
-    <dgm:txEffectClrLst/>
-  </dgm:styleLbl>
-  <dgm:styleLbl name="parChTrans1D1">
-    <dgm:fillClrLst meth="repeat">
-      <a:schemeClr val="accent5"/>
-    </dgm:fillClrLst>
-    <dgm:linClrLst meth="repeat">
-      <a:schemeClr val="accent5"/>
-    </dgm:linClrLst>
-    <dgm:effectClrLst/>
-    <dgm:txLinClrLst/>
-    <dgm:txFillClrLst meth="repeat">
-      <a:schemeClr val="tx1"/>
-    </dgm:txFillClrLst>
-    <dgm:txEffectClrLst/>
-  </dgm:styleLbl>
-  <dgm:styleLbl name="parChTrans1D2">
-    <dgm:fillClrLst meth="repeat">
-      <a:schemeClr val="accent6">
-        <a:tint val="90000"/>
-      </a:schemeClr>
-    </dgm:fillClrLst>
-    <dgm:linClrLst meth="repeat">
-      <a:schemeClr val="accent6"/>
-    </dgm:linClrLst>
-    <dgm:effectClrLst/>
-    <dgm:txLinClrLst/>
-    <dgm:txFillClrLst meth="repeat">
-      <a:schemeClr val="tx1"/>
-    </dgm:txFillClrLst>
-    <dgm:txEffectClrLst/>
-  </dgm:styleLbl>
-  <dgm:styleLbl name="parChTrans1D3">
-    <dgm:fillClrLst meth="repeat">
-      <a:schemeClr val="accent6">
-        <a:tint val="70000"/>
-      </a:schemeClr>
     </dgm:fillClrLst>
     <dgm:linClrLst meth="repeat">
       <a:schemeClr val="accent1"/>
@@ -525,14 +337,14 @@
     </dgm:txFillClrLst>
     <dgm:txEffectClrLst/>
   </dgm:styleLbl>
-  <dgm:styleLbl name="parChTrans1D4">
+  <dgm:styleLbl name="callout">
     <dgm:fillClrLst meth="repeat">
-      <a:schemeClr val="accent6">
+      <a:schemeClr val="accent1"/>
+    </dgm:fillClrLst>
+    <dgm:linClrLst meth="repeat">
+      <a:schemeClr val="accent1">
         <a:tint val="50000"/>
       </a:schemeClr>
-    </dgm:fillClrLst>
-    <dgm:linClrLst meth="repeat">
-      <a:schemeClr val="accent2"/>
     </dgm:linClrLst>
     <dgm:effectClrLst/>
     <dgm:txLinClrLst/>
@@ -541,15 +353,198 @@
     </dgm:txFillClrLst>
     <dgm:txEffectClrLst/>
   </dgm:styleLbl>
+  <dgm:styleLbl name="asst0">
+    <dgm:fillClrLst meth="repeat">
+      <a:schemeClr val="accent1"/>
+    </dgm:fillClrLst>
+    <dgm:linClrLst meth="repeat">
+      <a:schemeClr val="lt1"/>
+    </dgm:linClrLst>
+    <dgm:effectClrLst/>
+    <dgm:txLinClrLst/>
+    <dgm:txFillClrLst/>
+    <dgm:txEffectClrLst/>
+  </dgm:styleLbl>
+  <dgm:styleLbl name="asst1">
+    <dgm:fillClrLst meth="repeat">
+      <a:schemeClr val="accent1"/>
+    </dgm:fillClrLst>
+    <dgm:linClrLst meth="repeat">
+      <a:schemeClr val="lt1"/>
+    </dgm:linClrLst>
+    <dgm:effectClrLst/>
+    <dgm:txLinClrLst/>
+    <dgm:txFillClrLst/>
+    <dgm:txEffectClrLst/>
+  </dgm:styleLbl>
+  <dgm:styleLbl name="asst2">
+    <dgm:fillClrLst meth="repeat">
+      <a:schemeClr val="accent1"/>
+    </dgm:fillClrLst>
+    <dgm:linClrLst meth="repeat">
+      <a:schemeClr val="lt1"/>
+    </dgm:linClrLst>
+    <dgm:effectClrLst/>
+    <dgm:txLinClrLst/>
+    <dgm:txFillClrLst/>
+    <dgm:txEffectClrLst/>
+  </dgm:styleLbl>
+  <dgm:styleLbl name="asst3">
+    <dgm:fillClrLst meth="repeat">
+      <a:schemeClr val="accent1"/>
+    </dgm:fillClrLst>
+    <dgm:linClrLst meth="repeat">
+      <a:schemeClr val="lt1"/>
+    </dgm:linClrLst>
+    <dgm:effectClrLst/>
+    <dgm:txLinClrLst/>
+    <dgm:txFillClrLst/>
+    <dgm:txEffectClrLst/>
+  </dgm:styleLbl>
+  <dgm:styleLbl name="asst4">
+    <dgm:fillClrLst meth="repeat">
+      <a:schemeClr val="accent1"/>
+    </dgm:fillClrLst>
+    <dgm:linClrLst meth="repeat">
+      <a:schemeClr val="lt1"/>
+    </dgm:linClrLst>
+    <dgm:effectClrLst/>
+    <dgm:txLinClrLst/>
+    <dgm:txFillClrLst/>
+    <dgm:txEffectClrLst/>
+  </dgm:styleLbl>
+  <dgm:styleLbl name="parChTrans2D1">
+    <dgm:fillClrLst meth="repeat">
+      <a:schemeClr val="accent1">
+        <a:tint val="60000"/>
+      </a:schemeClr>
+    </dgm:fillClrLst>
+    <dgm:linClrLst meth="repeat">
+      <a:schemeClr val="accent1">
+        <a:tint val="60000"/>
+      </a:schemeClr>
+    </dgm:linClrLst>
+    <dgm:effectClrLst/>
+    <dgm:txLinClrLst/>
+    <dgm:txFillClrLst meth="repeat">
+      <a:schemeClr val="lt1"/>
+    </dgm:txFillClrLst>
+    <dgm:txEffectClrLst/>
+  </dgm:styleLbl>
+  <dgm:styleLbl name="parChTrans2D2">
+    <dgm:fillClrLst meth="repeat">
+      <a:schemeClr val="accent1"/>
+    </dgm:fillClrLst>
+    <dgm:linClrLst meth="repeat">
+      <a:schemeClr val="accent1"/>
+    </dgm:linClrLst>
+    <dgm:effectClrLst/>
+    <dgm:txLinClrLst/>
+    <dgm:txFillClrLst meth="repeat">
+      <a:schemeClr val="lt1"/>
+    </dgm:txFillClrLst>
+    <dgm:txEffectClrLst/>
+  </dgm:styleLbl>
+  <dgm:styleLbl name="parChTrans2D3">
+    <dgm:fillClrLst meth="repeat">
+      <a:schemeClr val="accent1"/>
+    </dgm:fillClrLst>
+    <dgm:linClrLst meth="repeat">
+      <a:schemeClr val="accent1"/>
+    </dgm:linClrLst>
+    <dgm:effectClrLst/>
+    <dgm:txLinClrLst/>
+    <dgm:txFillClrLst meth="repeat">
+      <a:schemeClr val="lt1"/>
+    </dgm:txFillClrLst>
+    <dgm:txEffectClrLst/>
+  </dgm:styleLbl>
+  <dgm:styleLbl name="parChTrans2D4">
+    <dgm:fillClrLst meth="repeat">
+      <a:schemeClr val="accent1"/>
+    </dgm:fillClrLst>
+    <dgm:linClrLst meth="repeat">
+      <a:schemeClr val="accent1"/>
+    </dgm:linClrLst>
+    <dgm:effectClrLst/>
+    <dgm:txLinClrLst/>
+    <dgm:txFillClrLst meth="repeat">
+      <a:schemeClr val="lt1"/>
+    </dgm:txFillClrLst>
+    <dgm:txEffectClrLst/>
+  </dgm:styleLbl>
+  <dgm:styleLbl name="parChTrans1D1">
+    <dgm:fillClrLst meth="repeat">
+      <a:schemeClr val="accent1"/>
+    </dgm:fillClrLst>
+    <dgm:linClrLst meth="repeat">
+      <a:schemeClr val="accent1">
+        <a:shade val="60000"/>
+      </a:schemeClr>
+    </dgm:linClrLst>
+    <dgm:effectClrLst/>
+    <dgm:txLinClrLst/>
+    <dgm:txFillClrLst meth="repeat">
+      <a:schemeClr val="tx1"/>
+    </dgm:txFillClrLst>
+    <dgm:txEffectClrLst/>
+  </dgm:styleLbl>
+  <dgm:styleLbl name="parChTrans1D2">
+    <dgm:fillClrLst meth="repeat">
+      <a:schemeClr val="accent1"/>
+    </dgm:fillClrLst>
+    <dgm:linClrLst meth="repeat">
+      <a:schemeClr val="accent1">
+        <a:shade val="60000"/>
+      </a:schemeClr>
+    </dgm:linClrLst>
+    <dgm:effectClrLst/>
+    <dgm:txLinClrLst/>
+    <dgm:txFillClrLst meth="repeat">
+      <a:schemeClr val="tx1"/>
+    </dgm:txFillClrLst>
+    <dgm:txEffectClrLst/>
+  </dgm:styleLbl>
+  <dgm:styleLbl name="parChTrans1D3">
+    <dgm:fillClrLst meth="repeat">
+      <a:schemeClr val="accent1"/>
+    </dgm:fillClrLst>
+    <dgm:linClrLst meth="repeat">
+      <a:schemeClr val="accent1">
+        <a:shade val="80000"/>
+      </a:schemeClr>
+    </dgm:linClrLst>
+    <dgm:effectClrLst/>
+    <dgm:txLinClrLst/>
+    <dgm:txFillClrLst meth="repeat">
+      <a:schemeClr val="tx1"/>
+    </dgm:txFillClrLst>
+    <dgm:txEffectClrLst/>
+  </dgm:styleLbl>
+  <dgm:styleLbl name="parChTrans1D4">
+    <dgm:fillClrLst meth="repeat">
+      <a:schemeClr val="accent1"/>
+    </dgm:fillClrLst>
+    <dgm:linClrLst meth="repeat">
+      <a:schemeClr val="accent1">
+        <a:shade val="80000"/>
+      </a:schemeClr>
+    </dgm:linClrLst>
+    <dgm:effectClrLst/>
+    <dgm:txLinClrLst/>
+    <dgm:txFillClrLst meth="repeat">
+      <a:schemeClr val="tx1"/>
+    </dgm:txFillClrLst>
+    <dgm:txEffectClrLst/>
+  </dgm:styleLbl>
   <dgm:styleLbl name="fgAcc1">
     <dgm:fillClrLst meth="repeat">
       <a:schemeClr val="lt1">
         <a:alpha val="90000"/>
       </a:schemeClr>
     </dgm:fillClrLst>
-    <dgm:linClrLst>
-      <a:schemeClr val="accent5"/>
-      <a:schemeClr val="accent6"/>
+    <dgm:linClrLst meth="repeat">
+      <a:schemeClr val="accent1"/>
     </dgm:linClrLst>
     <dgm:effectClrLst/>
     <dgm:txLinClrLst/>
@@ -564,9 +559,8 @@
         <a:alpha val="90000"/>
       </a:schemeClr>
     </dgm:fillClrLst>
-    <dgm:linClrLst>
-      <a:schemeClr val="accent5"/>
-      <a:schemeClr val="accent6"/>
+    <dgm:linClrLst meth="repeat">
+      <a:schemeClr val="accent1"/>
     </dgm:linClrLst>
     <dgm:effectClrLst/>
     <dgm:txLinClrLst/>
@@ -581,9 +575,8 @@
         <a:alpha val="90000"/>
       </a:schemeClr>
     </dgm:fillClrLst>
-    <dgm:linClrLst>
-      <a:schemeClr val="accent5"/>
-      <a:schemeClr val="accent6"/>
+    <dgm:linClrLst meth="repeat">
+      <a:schemeClr val="accent1"/>
     </dgm:linClrLst>
     <dgm:effectClrLst/>
     <dgm:txLinClrLst/>
@@ -599,7 +592,7 @@
       </a:schemeClr>
     </dgm:fillClrLst>
     <dgm:linClrLst meth="repeat">
-      <a:schemeClr val="accent5"/>
+      <a:schemeClr val="accent1"/>
     </dgm:linClrLst>
     <dgm:effectClrLst/>
     <dgm:txLinClrLst/>
@@ -614,9 +607,8 @@
         <a:alpha val="90000"/>
       </a:schemeClr>
     </dgm:fillClrLst>
-    <dgm:linClrLst>
-      <a:schemeClr val="accent5"/>
-      <a:schemeClr val="accent6"/>
+    <dgm:linClrLst meth="repeat">
+      <a:schemeClr val="accent1"/>
     </dgm:linClrLst>
     <dgm:effectClrLst/>
     <dgm:txLinClrLst/>
@@ -629,9 +621,8 @@
     <dgm:fillClrLst meth="repeat">
       <a:schemeClr val="lt1"/>
     </dgm:fillClrLst>
-    <dgm:linClrLst>
-      <a:schemeClr val="accent5"/>
-      <a:schemeClr val="accent6"/>
+    <dgm:linClrLst meth="repeat">
+      <a:schemeClr val="accent1"/>
     </dgm:linClrLst>
     <dgm:effectClrLst/>
     <dgm:txLinClrLst/>
@@ -644,9 +635,8 @@
     <dgm:fillClrLst meth="repeat">
       <a:schemeClr val="lt1"/>
     </dgm:fillClrLst>
-    <dgm:linClrLst>
-      <a:schemeClr val="accent5"/>
-      <a:schemeClr val="accent6"/>
+    <dgm:linClrLst meth="repeat">
+      <a:schemeClr val="accent1"/>
     </dgm:linClrLst>
     <dgm:effectClrLst/>
     <dgm:txLinClrLst/>
@@ -659,9 +649,8 @@
     <dgm:fillClrLst meth="repeat">
       <a:schemeClr val="lt1"/>
     </dgm:fillClrLst>
-    <dgm:linClrLst>
-      <a:schemeClr val="accent5"/>
-      <a:schemeClr val="accent6"/>
+    <dgm:linClrLst meth="repeat">
+      <a:schemeClr val="accent1"/>
     </dgm:linClrLst>
     <dgm:effectClrLst/>
     <dgm:txLinClrLst/>
@@ -671,24 +660,16 @@
     <dgm:txEffectClrLst/>
   </dgm:styleLbl>
   <dgm:styleLbl name="fgAccFollowNode1">
-    <dgm:fillClrLst>
-      <a:schemeClr val="accent5">
+    <dgm:fillClrLst meth="repeat">
+      <a:schemeClr val="accent1">
+        <a:alpha val="90000"/>
         <a:tint val="40000"/>
-        <a:alpha val="90000"/>
-      </a:schemeClr>
-      <a:schemeClr val="accent6">
-        <a:tint val="40000"/>
-        <a:alpha val="90000"/>
       </a:schemeClr>
     </dgm:fillClrLst>
-    <dgm:linClrLst>
-      <a:schemeClr val="accent5">
+    <dgm:linClrLst meth="repeat">
+      <a:schemeClr val="accent1">
+        <a:alpha val="90000"/>
         <a:tint val="40000"/>
-        <a:alpha val="90000"/>
-      </a:schemeClr>
-      <a:schemeClr val="accent5">
-        <a:tint val="40000"/>
-        <a:alpha val="90000"/>
       </a:schemeClr>
     </dgm:linClrLst>
     <dgm:effectClrLst/>
@@ -699,24 +680,16 @@
     <dgm:txEffectClrLst/>
   </dgm:styleLbl>
   <dgm:styleLbl name="alignAccFollowNode1">
-    <dgm:fillClrLst>
-      <a:schemeClr val="accent5">
+    <dgm:fillClrLst meth="repeat">
+      <a:schemeClr val="accent1">
+        <a:alpha val="90000"/>
         <a:tint val="40000"/>
-        <a:alpha val="90000"/>
-      </a:schemeClr>
-      <a:schemeClr val="accent6">
-        <a:tint val="40000"/>
-        <a:alpha val="90000"/>
       </a:schemeClr>
     </dgm:fillClrLst>
-    <dgm:linClrLst>
-      <a:schemeClr val="accent5">
+    <dgm:linClrLst meth="repeat">
+      <a:schemeClr val="accent1">
+        <a:alpha val="90000"/>
         <a:tint val="40000"/>
-        <a:alpha val="90000"/>
-      </a:schemeClr>
-      <a:schemeClr val="accent6">
-        <a:tint val="40000"/>
-        <a:alpha val="90000"/>
       </a:schemeClr>
     </dgm:linClrLst>
     <dgm:effectClrLst/>
@@ -727,24 +700,16 @@
     <dgm:txEffectClrLst/>
   </dgm:styleLbl>
   <dgm:styleLbl name="bgAccFollowNode1">
-    <dgm:fillClrLst>
-      <a:schemeClr val="accent5">
+    <dgm:fillClrLst meth="repeat">
+      <a:schemeClr val="accent1">
+        <a:alpha val="90000"/>
         <a:tint val="40000"/>
-        <a:alpha val="90000"/>
-      </a:schemeClr>
-      <a:schemeClr val="accent6">
-        <a:tint val="40000"/>
-        <a:alpha val="90000"/>
       </a:schemeClr>
     </dgm:fillClrLst>
-    <dgm:linClrLst>
-      <a:schemeClr val="accent5">
+    <dgm:linClrLst meth="repeat">
+      <a:schemeClr val="accent1">
+        <a:alpha val="90000"/>
         <a:tint val="40000"/>
-        <a:alpha val="90000"/>
-      </a:schemeClr>
-      <a:schemeClr val="accent6">
-        <a:tint val="40000"/>
-        <a:alpha val="90000"/>
       </a:schemeClr>
     </dgm:linClrLst>
     <dgm:effectClrLst/>
@@ -760,39 +725,7 @@
         <a:alpha val="90000"/>
       </a:schemeClr>
     </dgm:fillClrLst>
-    <dgm:linClrLst>
-      <a:schemeClr val="accent4"/>
-    </dgm:linClrLst>
-    <dgm:effectClrLst/>
-    <dgm:txLinClrLst/>
-    <dgm:txFillClrLst meth="repeat">
-      <a:schemeClr val="dk1"/>
-    </dgm:txFillClrLst>
-    <dgm:txEffectClrLst/>
-  </dgm:styleLbl>
-  <dgm:styleLbl name="fgAcc2">
-    <dgm:fillClrLst meth="repeat">
-      <a:schemeClr val="lt1">
-        <a:alpha val="90000"/>
-      </a:schemeClr>
-    </dgm:fillClrLst>
-    <dgm:linClrLst>
-      <a:schemeClr val="accent6"/>
-    </dgm:linClrLst>
-    <dgm:effectClrLst/>
-    <dgm:txLinClrLst/>
-    <dgm:txFillClrLst meth="repeat">
-      <a:schemeClr val="dk1"/>
-    </dgm:txFillClrLst>
-    <dgm:txEffectClrLst/>
-  </dgm:styleLbl>
-  <dgm:styleLbl name="fgAcc3">
-    <dgm:fillClrLst meth="repeat">
-      <a:schemeClr val="lt1">
-        <a:alpha val="90000"/>
-      </a:schemeClr>
-    </dgm:fillClrLst>
-    <dgm:linClrLst>
+    <dgm:linClrLst meth="repeat">
       <a:schemeClr val="accent1"/>
     </dgm:linClrLst>
     <dgm:effectClrLst/>
@@ -802,14 +735,14 @@
     </dgm:txFillClrLst>
     <dgm:txEffectClrLst/>
   </dgm:styleLbl>
-  <dgm:styleLbl name="fgAcc4">
+  <dgm:styleLbl name="fgAcc2">
     <dgm:fillClrLst meth="repeat">
       <a:schemeClr val="lt1">
         <a:alpha val="90000"/>
       </a:schemeClr>
     </dgm:fillClrLst>
-    <dgm:linClrLst>
-      <a:schemeClr val="accent2"/>
+    <dgm:linClrLst meth="repeat">
+      <a:schemeClr val="accent1"/>
     </dgm:linClrLst>
     <dgm:effectClrLst/>
     <dgm:txLinClrLst/>
@@ -818,14 +751,14 @@
     </dgm:txFillClrLst>
     <dgm:txEffectClrLst/>
   </dgm:styleLbl>
-  <dgm:styleLbl name="bgShp">
+  <dgm:styleLbl name="fgAcc3">
     <dgm:fillClrLst meth="repeat">
-      <a:schemeClr val="accent5">
-        <a:tint val="40000"/>
+      <a:schemeClr val="lt1">
+        <a:alpha val="90000"/>
       </a:schemeClr>
     </dgm:fillClrLst>
     <dgm:linClrLst meth="repeat">
-      <a:schemeClr val="dk1"/>
+      <a:schemeClr val="accent1"/>
     </dgm:linClrLst>
     <dgm:effectClrLst/>
     <dgm:txLinClrLst/>
@@ -834,14 +767,46 @@
     </dgm:txFillClrLst>
     <dgm:txEffectClrLst/>
   </dgm:styleLbl>
-  <dgm:styleLbl name="dkBgShp">
+  <dgm:styleLbl name="fgAcc4">
     <dgm:fillClrLst meth="repeat">
-      <a:schemeClr val="accent5">
-        <a:shade val="90000"/>
+      <a:schemeClr val="lt1">
+        <a:alpha val="90000"/>
       </a:schemeClr>
     </dgm:fillClrLst>
     <dgm:linClrLst meth="repeat">
+      <a:schemeClr val="accent1"/>
+    </dgm:linClrLst>
+    <dgm:effectClrLst/>
+    <dgm:txLinClrLst/>
+    <dgm:txFillClrLst meth="repeat">
       <a:schemeClr val="dk1"/>
+    </dgm:txFillClrLst>
+    <dgm:txEffectClrLst/>
+  </dgm:styleLbl>
+  <dgm:styleLbl name="bgShp">
+    <dgm:fillClrLst meth="repeat">
+      <a:schemeClr val="accent1">
+        <a:tint val="40000"/>
+      </a:schemeClr>
+    </dgm:fillClrLst>
+    <dgm:linClrLst meth="repeat">
+      <a:schemeClr val="accent1"/>
+    </dgm:linClrLst>
+    <dgm:effectClrLst/>
+    <dgm:txLinClrLst/>
+    <dgm:txFillClrLst meth="repeat">
+      <a:schemeClr val="dk1"/>
+    </dgm:txFillClrLst>
+    <dgm:txEffectClrLst/>
+  </dgm:styleLbl>
+  <dgm:styleLbl name="dkBgShp">
+    <dgm:fillClrLst meth="repeat">
+      <a:schemeClr val="accent1">
+        <a:shade val="80000"/>
+      </a:schemeClr>
+    </dgm:fillClrLst>
+    <dgm:linClrLst meth="repeat">
+      <a:schemeClr val="accent1"/>
     </dgm:linClrLst>
     <dgm:effectClrLst/>
     <dgm:txLinClrLst/>
@@ -852,13 +817,13 @@
   </dgm:styleLbl>
   <dgm:styleLbl name="trBgShp">
     <dgm:fillClrLst meth="repeat">
-      <a:schemeClr val="accent5">
+      <a:schemeClr val="accent1">
         <a:tint val="50000"/>
         <a:alpha val="40000"/>
       </a:schemeClr>
     </dgm:fillClrLst>
     <dgm:linClrLst meth="repeat">
-      <a:schemeClr val="accent5"/>
+      <a:schemeClr val="accent1"/>
     </dgm:linClrLst>
     <dgm:effectClrLst/>
     <dgm:txLinClrLst/>
@@ -869,8 +834,8 @@
   </dgm:styleLbl>
   <dgm:styleLbl name="fgShp">
     <dgm:fillClrLst meth="repeat">
-      <a:schemeClr val="accent5">
-        <a:tint val="40000"/>
+      <a:schemeClr val="accent1">
+        <a:tint val="60000"/>
       </a:schemeClr>
     </dgm:fillClrLst>
     <dgm:linClrLst meth="repeat">
@@ -1690,7 +1655,7 @@
 <dgm:dataModel xmlns:dgm="http://schemas.openxmlformats.org/drawingml/2006/diagram" xmlns:a="http://schemas.openxmlformats.org/drawingml/2006/main">
   <dgm:ptLst>
     <dgm:pt modelId="{BDE580A7-3497-4A1F-8C9B-261EAC4C669F}" type="doc">
-      <dgm:prSet loTypeId="urn:microsoft.com/office/officeart/2016/7/layout/BasicLinearProcessNumbered" loCatId="process" qsTypeId="urn:microsoft.com/office/officeart/2005/8/quickstyle/simple4" qsCatId="simple" csTypeId="urn:microsoft.com/office/officeart/2005/8/colors/colorful5" csCatId="colorful"/>
+      <dgm:prSet loTypeId="urn:microsoft.com/office/officeart/2005/8/layout/chevron1" loCatId="process" qsTypeId="urn:microsoft.com/office/officeart/2005/8/quickstyle/simple4" qsCatId="simple" csTypeId="urn:microsoft.com/office/officeart/2005/8/colors/accent1_2" csCatId="accent1" phldr="1"/>
       <dgm:spPr/>
       <dgm:t>
         <a:bodyPr/>
@@ -1709,9 +1674,8 @@
         <a:p>
           <a:r>
             <a:rPr lang="pt-BR" dirty="0"/>
-            <a:t>Conseguir terminar um projeto full-Stack;</a:t>
+            <a:t>Conseguir me amadurecer perante da situação;</a:t>
           </a:r>
-          <a:endParaRPr lang="en-US" dirty="0"/>
         </a:p>
       </dgm:t>
     </dgm:pt>
@@ -1733,14 +1697,11 @@
         <a:bodyPr/>
         <a:lstStyle/>
         <a:p>
-          <a:r>
-            <a:rPr lang="en-US"/>
-            <a:t>1</a:t>
-          </a:r>
+          <a:endParaRPr lang="en-US"/>
         </a:p>
       </dgm:t>
     </dgm:pt>
-    <dgm:pt modelId="{7F261E43-C05D-4ABE-BBB6-913F19261956}">
+    <dgm:pt modelId="{85043397-DBCA-4103-9F0F-3478833FB191}">
       <dgm:prSet/>
       <dgm:spPr/>
       <dgm:t>
@@ -1749,115 +1710,63 @@
         <a:p>
           <a:r>
             <a:rPr lang="pt-BR"/>
-            <a:t>Conseguir me amadurecer perante da situação;</a:t>
+            <a:t>Conseguir terminar um projeto full-Stack;</a:t>
           </a:r>
-          <a:endParaRPr lang="en-US"/>
+          <a:endParaRPr lang="en-US" dirty="0"/>
         </a:p>
       </dgm:t>
     </dgm:pt>
-    <dgm:pt modelId="{D33CDA9D-4DCE-4089-A2FE-ADA7C963724D}" type="parTrans" cxnId="{B14E75A8-0F77-4521-AD3D-4E477508FCAF}">
+    <dgm:pt modelId="{F591484F-34D8-4081-B8F1-A643EA882508}" type="parTrans" cxnId="{156D07D8-6B5B-4C14-8E92-BA8FEF5FDFF2}">
       <dgm:prSet/>
       <dgm:spPr/>
       <dgm:t>
         <a:bodyPr/>
         <a:lstStyle/>
         <a:p>
-          <a:endParaRPr lang="en-US"/>
+          <a:endParaRPr lang="pt-BR"/>
         </a:p>
       </dgm:t>
     </dgm:pt>
-    <dgm:pt modelId="{72BB5DBA-B6D9-46C5-922E-D407C09C53A4}" type="sibTrans" cxnId="{B14E75A8-0F77-4521-AD3D-4E477508FCAF}">
-      <dgm:prSet phldrT="2" phldr="0"/>
+    <dgm:pt modelId="{C12ABB1B-1240-428D-83BD-88DC0E566AC5}" type="sibTrans" cxnId="{156D07D8-6B5B-4C14-8E92-BA8FEF5FDFF2}">
+      <dgm:prSet/>
       <dgm:spPr/>
       <dgm:t>
         <a:bodyPr/>
         <a:lstStyle/>
         <a:p>
-          <a:r>
-            <a:rPr lang="en-US"/>
-            <a:t>2</a:t>
-          </a:r>
+          <a:endParaRPr lang="pt-BR"/>
         </a:p>
       </dgm:t>
     </dgm:pt>
-    <dgm:pt modelId="{9F9CA643-1CA1-41D4-A560-5273A30D5FB2}" type="pres">
+    <dgm:pt modelId="{CD75A861-DB65-4B57-9E49-DA38795D8D33}" type="pres">
       <dgm:prSet presAssocID="{BDE580A7-3497-4A1F-8C9B-261EAC4C669F}" presName="Name0" presStyleCnt="0">
         <dgm:presLayoutVars>
+          <dgm:dir/>
           <dgm:animLvl val="lvl"/>
           <dgm:resizeHandles val="exact"/>
         </dgm:presLayoutVars>
       </dgm:prSet>
       <dgm:spPr/>
     </dgm:pt>
-    <dgm:pt modelId="{04038754-57BE-4816-840A-528CEF7D7E47}" type="pres">
-      <dgm:prSet presAssocID="{793035F4-7D60-4E6D-A23F-24FCEB25848C}" presName="compositeNode" presStyleCnt="0">
+    <dgm:pt modelId="{6AD1853F-AE65-4D68-B0A9-0C2B472AD1C2}" type="pres">
+      <dgm:prSet presAssocID="{793035F4-7D60-4E6D-A23F-24FCEB25848C}" presName="parTxOnly" presStyleLbl="node1" presStyleIdx="0" presStyleCnt="2">
         <dgm:presLayoutVars>
+          <dgm:chMax val="0"/>
+          <dgm:chPref val="0"/>
           <dgm:bulletEnabled val="1"/>
         </dgm:presLayoutVars>
       </dgm:prSet>
       <dgm:spPr/>
     </dgm:pt>
-    <dgm:pt modelId="{98FFC2FC-E496-45FB-9B45-68747B7319E3}" type="pres">
-      <dgm:prSet presAssocID="{793035F4-7D60-4E6D-A23F-24FCEB25848C}" presName="bgRect" presStyleLbl="bgAccFollowNode1" presStyleIdx="0" presStyleCnt="2"/>
+    <dgm:pt modelId="{3CCF3293-F9EF-49D3-AFD8-9C32EA1C6D91}" type="pres">
+      <dgm:prSet presAssocID="{49228ABC-EB9E-4DF4-8DFD-B8E76FF80CC9}" presName="parTxOnlySpace" presStyleCnt="0"/>
       <dgm:spPr/>
     </dgm:pt>
-    <dgm:pt modelId="{699CE4D7-929B-410B-9091-EBBE1C9E6968}" type="pres">
-      <dgm:prSet presAssocID="{49228ABC-EB9E-4DF4-8DFD-B8E76FF80CC9}" presName="sibTransNodeCircle" presStyleLbl="alignNode1" presStyleIdx="0" presStyleCnt="4">
+    <dgm:pt modelId="{A58F9F6B-5F2D-4DE4-961F-8C0DF1404A32}" type="pres">
+      <dgm:prSet presAssocID="{85043397-DBCA-4103-9F0F-3478833FB191}" presName="parTxOnly" presStyleLbl="node1" presStyleIdx="1" presStyleCnt="2">
         <dgm:presLayoutVars>
           <dgm:chMax val="0"/>
-          <dgm:bulletEnabled/>
-        </dgm:presLayoutVars>
-      </dgm:prSet>
-      <dgm:spPr/>
-    </dgm:pt>
-    <dgm:pt modelId="{B4BBFC7D-8AE3-40C8-B52A-B08272CE10D6}" type="pres">
-      <dgm:prSet presAssocID="{793035F4-7D60-4E6D-A23F-24FCEB25848C}" presName="bottomLine" presStyleLbl="alignNode1" presStyleIdx="1" presStyleCnt="4">
-        <dgm:presLayoutVars/>
-      </dgm:prSet>
-      <dgm:spPr/>
-    </dgm:pt>
-    <dgm:pt modelId="{FAEBF033-D5BC-4FB6-B450-D66B6DF41A3D}" type="pres">
-      <dgm:prSet presAssocID="{793035F4-7D60-4E6D-A23F-24FCEB25848C}" presName="nodeText" presStyleLbl="bgAccFollowNode1" presStyleIdx="0" presStyleCnt="2">
-        <dgm:presLayoutVars>
-          <dgm:bulletEnabled val="1"/>
-        </dgm:presLayoutVars>
-      </dgm:prSet>
-      <dgm:spPr/>
-    </dgm:pt>
-    <dgm:pt modelId="{C85E3E21-4D38-4087-BAB6-0F8C22EBD463}" type="pres">
-      <dgm:prSet presAssocID="{49228ABC-EB9E-4DF4-8DFD-B8E76FF80CC9}" presName="sibTrans" presStyleCnt="0"/>
-      <dgm:spPr/>
-    </dgm:pt>
-    <dgm:pt modelId="{E66E81F0-19CE-4E40-AEB5-94434358A6BC}" type="pres">
-      <dgm:prSet presAssocID="{7F261E43-C05D-4ABE-BBB6-913F19261956}" presName="compositeNode" presStyleCnt="0">
-        <dgm:presLayoutVars>
-          <dgm:bulletEnabled val="1"/>
-        </dgm:presLayoutVars>
-      </dgm:prSet>
-      <dgm:spPr/>
-    </dgm:pt>
-    <dgm:pt modelId="{0E41AABF-E455-435B-AC1C-B99DE40A2B1D}" type="pres">
-      <dgm:prSet presAssocID="{7F261E43-C05D-4ABE-BBB6-913F19261956}" presName="bgRect" presStyleLbl="bgAccFollowNode1" presStyleIdx="1" presStyleCnt="2"/>
-      <dgm:spPr/>
-    </dgm:pt>
-    <dgm:pt modelId="{FE701603-51CF-41DC-956B-B8DB008A9EB6}" type="pres">
-      <dgm:prSet presAssocID="{72BB5DBA-B6D9-46C5-922E-D407C09C53A4}" presName="sibTransNodeCircle" presStyleLbl="alignNode1" presStyleIdx="2" presStyleCnt="4">
-        <dgm:presLayoutVars>
-          <dgm:chMax val="0"/>
-          <dgm:bulletEnabled/>
-        </dgm:presLayoutVars>
-      </dgm:prSet>
-      <dgm:spPr/>
-    </dgm:pt>
-    <dgm:pt modelId="{693E7664-CAB8-441E-86AD-B4B3E3392F6E}" type="pres">
-      <dgm:prSet presAssocID="{7F261E43-C05D-4ABE-BBB6-913F19261956}" presName="bottomLine" presStyleLbl="alignNode1" presStyleIdx="3" presStyleCnt="4">
-        <dgm:presLayoutVars/>
-      </dgm:prSet>
-      <dgm:spPr/>
-    </dgm:pt>
-    <dgm:pt modelId="{A7825B01-4252-42A2-9DF7-CB3A8B4A4EEF}" type="pres">
-      <dgm:prSet presAssocID="{7F261E43-C05D-4ABE-BBB6-913F19261956}" presName="nodeText" presStyleLbl="bgAccFollowNode1" presStyleIdx="1" presStyleCnt="2">
-        <dgm:presLayoutVars>
+          <dgm:chPref val="0"/>
           <dgm:bulletEnabled val="1"/>
         </dgm:presLayoutVars>
       </dgm:prSet>
@@ -1865,26 +1774,14 @@
     </dgm:pt>
   </dgm:ptLst>
   <dgm:cxnLst>
-    <dgm:cxn modelId="{DD29C91F-57E8-4B91-8BF2-28A0C493E524}" type="presOf" srcId="{7F261E43-C05D-4ABE-BBB6-913F19261956}" destId="{A7825B01-4252-42A2-9DF7-CB3A8B4A4EEF}" srcOrd="1" destOrd="0" presId="urn:microsoft.com/office/officeart/2016/7/layout/BasicLinearProcessNumbered"/>
-    <dgm:cxn modelId="{C63E342F-A1E3-4F31-B213-FD93D623D659}" type="presOf" srcId="{49228ABC-EB9E-4DF4-8DFD-B8E76FF80CC9}" destId="{699CE4D7-929B-410B-9091-EBBE1C9E6968}" srcOrd="0" destOrd="0" presId="urn:microsoft.com/office/officeart/2016/7/layout/BasicLinearProcessNumbered"/>
-    <dgm:cxn modelId="{A6732034-1161-4728-93E0-E18326585B07}" type="presOf" srcId="{793035F4-7D60-4E6D-A23F-24FCEB25848C}" destId="{FAEBF033-D5BC-4FB6-B450-D66B6DF41A3D}" srcOrd="1" destOrd="0" presId="urn:microsoft.com/office/officeart/2016/7/layout/BasicLinearProcessNumbered"/>
-    <dgm:cxn modelId="{9D636349-F322-424B-B80C-B055BF9FC637}" type="presOf" srcId="{7F261E43-C05D-4ABE-BBB6-913F19261956}" destId="{0E41AABF-E455-435B-AC1C-B99DE40A2B1D}" srcOrd="0" destOrd="0" presId="urn:microsoft.com/office/officeart/2016/7/layout/BasicLinearProcessNumbered"/>
+    <dgm:cxn modelId="{CF35F711-2618-4ECF-9350-94257F12B560}" type="presOf" srcId="{BDE580A7-3497-4A1F-8C9B-261EAC4C669F}" destId="{CD75A861-DB65-4B57-9E49-DA38795D8D33}" srcOrd="0" destOrd="0" presId="urn:microsoft.com/office/officeart/2005/8/layout/chevron1"/>
     <dgm:cxn modelId="{CE5E969B-FAB4-46AD-99DB-8D889559AE88}" srcId="{BDE580A7-3497-4A1F-8C9B-261EAC4C669F}" destId="{793035F4-7D60-4E6D-A23F-24FCEB25848C}" srcOrd="0" destOrd="0" parTransId="{08AF61A2-7144-45D2-A6A0-F746D010A290}" sibTransId="{49228ABC-EB9E-4DF4-8DFD-B8E76FF80CC9}"/>
-    <dgm:cxn modelId="{04E904A6-54B7-4DC9-B4C9-F4A5FEE493C6}" type="presOf" srcId="{BDE580A7-3497-4A1F-8C9B-261EAC4C669F}" destId="{9F9CA643-1CA1-41D4-A560-5273A30D5FB2}" srcOrd="0" destOrd="0" presId="urn:microsoft.com/office/officeart/2016/7/layout/BasicLinearProcessNumbered"/>
-    <dgm:cxn modelId="{B14E75A8-0F77-4521-AD3D-4E477508FCAF}" srcId="{BDE580A7-3497-4A1F-8C9B-261EAC4C669F}" destId="{7F261E43-C05D-4ABE-BBB6-913F19261956}" srcOrd="1" destOrd="0" parTransId="{D33CDA9D-4DCE-4089-A2FE-ADA7C963724D}" sibTransId="{72BB5DBA-B6D9-46C5-922E-D407C09C53A4}"/>
-    <dgm:cxn modelId="{7AFF78AF-3BE4-4EA0-8628-8E6DE3B6D2E3}" type="presOf" srcId="{72BB5DBA-B6D9-46C5-922E-D407C09C53A4}" destId="{FE701603-51CF-41DC-956B-B8DB008A9EB6}" srcOrd="0" destOrd="0" presId="urn:microsoft.com/office/officeart/2016/7/layout/BasicLinearProcessNumbered"/>
-    <dgm:cxn modelId="{E0AA32D3-EEB8-499D-9C04-67F7505A2514}" type="presOf" srcId="{793035F4-7D60-4E6D-A23F-24FCEB25848C}" destId="{98FFC2FC-E496-45FB-9B45-68747B7319E3}" srcOrd="0" destOrd="0" presId="urn:microsoft.com/office/officeart/2016/7/layout/BasicLinearProcessNumbered"/>
-    <dgm:cxn modelId="{995022CF-441A-49B3-9D67-3B807E225517}" type="presParOf" srcId="{9F9CA643-1CA1-41D4-A560-5273A30D5FB2}" destId="{04038754-57BE-4816-840A-528CEF7D7E47}" srcOrd="0" destOrd="0" presId="urn:microsoft.com/office/officeart/2016/7/layout/BasicLinearProcessNumbered"/>
-    <dgm:cxn modelId="{CFE2681F-0C51-4FC8-86A7-8A20328CA51B}" type="presParOf" srcId="{04038754-57BE-4816-840A-528CEF7D7E47}" destId="{98FFC2FC-E496-45FB-9B45-68747B7319E3}" srcOrd="0" destOrd="0" presId="urn:microsoft.com/office/officeart/2016/7/layout/BasicLinearProcessNumbered"/>
-    <dgm:cxn modelId="{015B3D05-ECE2-404C-9F99-29F24A922B15}" type="presParOf" srcId="{04038754-57BE-4816-840A-528CEF7D7E47}" destId="{699CE4D7-929B-410B-9091-EBBE1C9E6968}" srcOrd="1" destOrd="0" presId="urn:microsoft.com/office/officeart/2016/7/layout/BasicLinearProcessNumbered"/>
-    <dgm:cxn modelId="{B7D14E19-FAD6-4631-8AE9-E1A0B95FC9E8}" type="presParOf" srcId="{04038754-57BE-4816-840A-528CEF7D7E47}" destId="{B4BBFC7D-8AE3-40C8-B52A-B08272CE10D6}" srcOrd="2" destOrd="0" presId="urn:microsoft.com/office/officeart/2016/7/layout/BasicLinearProcessNumbered"/>
-    <dgm:cxn modelId="{844DA5FE-94BE-4012-BC21-83D376B44376}" type="presParOf" srcId="{04038754-57BE-4816-840A-528CEF7D7E47}" destId="{FAEBF033-D5BC-4FB6-B450-D66B6DF41A3D}" srcOrd="3" destOrd="0" presId="urn:microsoft.com/office/officeart/2016/7/layout/BasicLinearProcessNumbered"/>
-    <dgm:cxn modelId="{C6DE2BAB-20BD-477D-A486-FD813765A403}" type="presParOf" srcId="{9F9CA643-1CA1-41D4-A560-5273A30D5FB2}" destId="{C85E3E21-4D38-4087-BAB6-0F8C22EBD463}" srcOrd="1" destOrd="0" presId="urn:microsoft.com/office/officeart/2016/7/layout/BasicLinearProcessNumbered"/>
-    <dgm:cxn modelId="{813317F7-CD10-418D-944F-93F26480B5CC}" type="presParOf" srcId="{9F9CA643-1CA1-41D4-A560-5273A30D5FB2}" destId="{E66E81F0-19CE-4E40-AEB5-94434358A6BC}" srcOrd="2" destOrd="0" presId="urn:microsoft.com/office/officeart/2016/7/layout/BasicLinearProcessNumbered"/>
-    <dgm:cxn modelId="{BB9B2EC0-E565-4748-8419-8B116FD5AE8F}" type="presParOf" srcId="{E66E81F0-19CE-4E40-AEB5-94434358A6BC}" destId="{0E41AABF-E455-435B-AC1C-B99DE40A2B1D}" srcOrd="0" destOrd="0" presId="urn:microsoft.com/office/officeart/2016/7/layout/BasicLinearProcessNumbered"/>
-    <dgm:cxn modelId="{95B288BF-6085-4FF1-8AE3-F22BC9D98C82}" type="presParOf" srcId="{E66E81F0-19CE-4E40-AEB5-94434358A6BC}" destId="{FE701603-51CF-41DC-956B-B8DB008A9EB6}" srcOrd="1" destOrd="0" presId="urn:microsoft.com/office/officeart/2016/7/layout/BasicLinearProcessNumbered"/>
-    <dgm:cxn modelId="{F699F6FE-2AD0-4E8E-B982-F22FE0FA6593}" type="presParOf" srcId="{E66E81F0-19CE-4E40-AEB5-94434358A6BC}" destId="{693E7664-CAB8-441E-86AD-B4B3E3392F6E}" srcOrd="2" destOrd="0" presId="urn:microsoft.com/office/officeart/2016/7/layout/BasicLinearProcessNumbered"/>
-    <dgm:cxn modelId="{F02A58C5-9CA9-4F23-B795-1D08D198981F}" type="presParOf" srcId="{E66E81F0-19CE-4E40-AEB5-94434358A6BC}" destId="{A7825B01-4252-42A2-9DF7-CB3A8B4A4EEF}" srcOrd="3" destOrd="0" presId="urn:microsoft.com/office/officeart/2016/7/layout/BasicLinearProcessNumbered"/>
+    <dgm:cxn modelId="{20DDCABA-2275-49C3-B404-840BCDF6B47E}" type="presOf" srcId="{85043397-DBCA-4103-9F0F-3478833FB191}" destId="{A58F9F6B-5F2D-4DE4-961F-8C0DF1404A32}" srcOrd="0" destOrd="0" presId="urn:microsoft.com/office/officeart/2005/8/layout/chevron1"/>
+    <dgm:cxn modelId="{156D07D8-6B5B-4C14-8E92-BA8FEF5FDFF2}" srcId="{BDE580A7-3497-4A1F-8C9B-261EAC4C669F}" destId="{85043397-DBCA-4103-9F0F-3478833FB191}" srcOrd="1" destOrd="0" parTransId="{F591484F-34D8-4081-B8F1-A643EA882508}" sibTransId="{C12ABB1B-1240-428D-83BD-88DC0E566AC5}"/>
+    <dgm:cxn modelId="{9B52F6F9-4CFD-4D88-9B1C-DC406501C86A}" type="presOf" srcId="{793035F4-7D60-4E6D-A23F-24FCEB25848C}" destId="{6AD1853F-AE65-4D68-B0A9-0C2B472AD1C2}" srcOrd="0" destOrd="0" presId="urn:microsoft.com/office/officeart/2005/8/layout/chevron1"/>
+    <dgm:cxn modelId="{C80BA627-F37F-422A-BD7A-73C6C69D5C14}" type="presParOf" srcId="{CD75A861-DB65-4B57-9E49-DA38795D8D33}" destId="{6AD1853F-AE65-4D68-B0A9-0C2B472AD1C2}" srcOrd="0" destOrd="0" presId="urn:microsoft.com/office/officeart/2005/8/layout/chevron1"/>
+    <dgm:cxn modelId="{C431EFE9-867D-4723-B07F-EC1089020C9C}" type="presParOf" srcId="{CD75A861-DB65-4B57-9E49-DA38795D8D33}" destId="{3CCF3293-F9EF-49D3-AFD8-9C32EA1C6D91}" srcOrd="1" destOrd="0" presId="urn:microsoft.com/office/officeart/2005/8/layout/chevron1"/>
+    <dgm:cxn modelId="{EE5D4F00-630E-4614-B7DE-8FD507CDCCC5}" type="presParOf" srcId="{CD75A861-DB65-4B57-9E49-DA38795D8D33}" destId="{A58F9F6B-5F2D-4DE4-961F-8C0DF1404A32}" srcOrd="2" destOrd="0" presId="urn:microsoft.com/office/officeart/2005/8/layout/chevron1"/>
   </dgm:cxnLst>
   <dgm:bg/>
   <dgm:whole/>
@@ -2148,104 +2045,23 @@
       <dsp:cNvGrpSpPr/>
     </dsp:nvGrpSpPr>
     <dsp:grpSpPr/>
-    <dsp:sp modelId="{98FFC2FC-E496-45FB-9B45-68747B7319E3}">
+    <dsp:sp modelId="{6AD1853F-AE65-4D68-B0A9-0C2B472AD1C2}">
       <dsp:nvSpPr>
         <dsp:cNvPr id="0" name=""/>
         <dsp:cNvSpPr/>
       </dsp:nvSpPr>
       <dsp:spPr>
         <a:xfrm>
-          <a:off x="1253" y="0"/>
-          <a:ext cx="4888306" cy="3364414"/>
+          <a:off x="9024" y="412525"/>
+          <a:ext cx="5394684" cy="2157873"/>
         </a:xfrm>
-        <a:prstGeom prst="rect">
-          <a:avLst/>
-        </a:prstGeom>
-        <a:solidFill>
-          <a:schemeClr val="accent5">
-            <a:tint val="40000"/>
-            <a:alpha val="90000"/>
-            <a:hueOff val="0"/>
-            <a:satOff val="0"/>
-            <a:lumOff val="0"/>
-            <a:alphaOff val="0"/>
-          </a:schemeClr>
-        </a:solidFill>
-        <a:ln w="6350" cap="flat" cmpd="sng" algn="ctr">
-          <a:solidFill>
-            <a:schemeClr val="accent5">
-              <a:tint val="40000"/>
-              <a:alpha val="90000"/>
-              <a:hueOff val="0"/>
-              <a:satOff val="0"/>
-              <a:lumOff val="0"/>
-              <a:alphaOff val="0"/>
-            </a:schemeClr>
-          </a:solidFill>
-          <a:prstDash val="solid"/>
-          <a:miter lim="800000"/>
-        </a:ln>
-        <a:effectLst/>
-      </dsp:spPr>
-      <dsp:style>
-        <a:lnRef idx="1">
-          <a:scrgbClr r="0" g="0" b="0"/>
-        </a:lnRef>
-        <a:fillRef idx="1">
-          <a:scrgbClr r="0" g="0" b="0"/>
-        </a:fillRef>
-        <a:effectRef idx="0">
-          <a:scrgbClr r="0" g="0" b="0"/>
-        </a:effectRef>
-        <a:fontRef idx="minor"/>
-      </dsp:style>
-      <dsp:txBody>
-        <a:bodyPr spcFirstLastPara="0" vert="horz" wrap="square" lIns="381111" tIns="330200" rIns="381111" bIns="330200" numCol="1" spcCol="1270" anchor="t" anchorCtr="0">
-          <a:noAutofit/>
-        </a:bodyPr>
-        <a:lstStyle/>
-        <a:p>
-          <a:pPr marL="0" lvl="0" indent="0" algn="l" defTabSz="1155700">
-            <a:lnSpc>
-              <a:spcPct val="90000"/>
-            </a:lnSpc>
-            <a:spcBef>
-              <a:spcPct val="0"/>
-            </a:spcBef>
-            <a:spcAft>
-              <a:spcPct val="35000"/>
-            </a:spcAft>
-            <a:buNone/>
-          </a:pPr>
-          <a:r>
-            <a:rPr lang="pt-BR" sz="2600" kern="1200" dirty="0"/>
-            <a:t>Conseguir terminar um projeto full-Stack;</a:t>
-          </a:r>
-          <a:endParaRPr lang="en-US" sz="2600" kern="1200" dirty="0"/>
-        </a:p>
-      </dsp:txBody>
-      <dsp:txXfrm>
-        <a:off x="1253" y="1278477"/>
-        <a:ext cx="4888306" cy="2018648"/>
-      </dsp:txXfrm>
-    </dsp:sp>
-    <dsp:sp modelId="{699CE4D7-929B-410B-9091-EBBE1C9E6968}">
-      <dsp:nvSpPr>
-        <dsp:cNvPr id="0" name=""/>
-        <dsp:cNvSpPr/>
-      </dsp:nvSpPr>
-      <dsp:spPr>
-        <a:xfrm>
-          <a:off x="1940744" y="336441"/>
-          <a:ext cx="1009324" cy="1009324"/>
-        </a:xfrm>
-        <a:prstGeom prst="ellipse">
+        <a:prstGeom prst="chevron">
           <a:avLst/>
         </a:prstGeom>
         <a:gradFill rotWithShape="0">
           <a:gsLst>
             <a:gs pos="0">
-              <a:schemeClr val="accent5">
+              <a:schemeClr val="accent1">
                 <a:hueOff val="0"/>
                 <a:satOff val="0"/>
                 <a:lumOff val="0"/>
@@ -2256,7 +2072,7 @@
               </a:schemeClr>
             </a:gs>
             <a:gs pos="50000">
-              <a:schemeClr val="accent5">
+              <a:schemeClr val="accent1">
                 <a:hueOff val="0"/>
                 <a:satOff val="0"/>
                 <a:lumOff val="0"/>
@@ -2267,7 +2083,7 @@
               </a:schemeClr>
             </a:gs>
             <a:gs pos="100000">
-              <a:schemeClr val="accent5">
+              <a:schemeClr val="accent1">
                 <a:hueOff val="0"/>
                 <a:satOff val="0"/>
                 <a:lumOff val="0"/>
@@ -2280,22 +2096,13 @@
           </a:gsLst>
           <a:lin ang="5400000" scaled="0"/>
         </a:gradFill>
-        <a:ln w="6350" cap="flat" cmpd="sng" algn="ctr">
-          <a:solidFill>
-            <a:schemeClr val="accent5">
-              <a:hueOff val="0"/>
-              <a:satOff val="0"/>
-              <a:lumOff val="0"/>
-              <a:alphaOff val="0"/>
-            </a:schemeClr>
-          </a:solidFill>
-          <a:prstDash val="solid"/>
-          <a:miter lim="800000"/>
+        <a:ln>
+          <a:noFill/>
         </a:ln>
         <a:effectLst/>
       </dsp:spPr>
       <dsp:style>
-        <a:lnRef idx="1">
+        <a:lnRef idx="0">
           <a:scrgbClr r="0" g="0" b="0"/>
         </a:lnRef>
         <a:fillRef idx="3">
@@ -2309,12 +2116,12 @@
         </a:fontRef>
       </dsp:style>
       <dsp:txBody>
-        <a:bodyPr spcFirstLastPara="0" vert="horz" wrap="square" lIns="78691" tIns="12700" rIns="78691" bIns="12700" numCol="1" spcCol="1270" anchor="ctr" anchorCtr="0">
+        <a:bodyPr spcFirstLastPara="0" vert="horz" wrap="square" lIns="156020" tIns="52007" rIns="52007" bIns="52007" numCol="1" spcCol="1270" anchor="ctr" anchorCtr="0">
           <a:noAutofit/>
         </a:bodyPr>
         <a:lstStyle/>
         <a:p>
-          <a:pPr marL="0" lvl="0" indent="0" algn="ctr" defTabSz="2133600">
+          <a:pPr marL="0" lvl="0" indent="0" algn="ctr" defTabSz="1733550">
             <a:lnSpc>
               <a:spcPct val="90000"/>
             </a:lnSpc>
@@ -2327,36 +2134,36 @@
             <a:buNone/>
           </a:pPr>
           <a:r>
-            <a:rPr lang="en-US" sz="4800" kern="1200"/>
-            <a:t>1</a:t>
+            <a:rPr lang="pt-BR" sz="3900" kern="1200" dirty="0"/>
+            <a:t>Conseguir me amadurecer perante da situação;</a:t>
           </a:r>
         </a:p>
       </dsp:txBody>
       <dsp:txXfrm>
-        <a:off x="2088556" y="484253"/>
-        <a:ext cx="713700" cy="713700"/>
+        <a:off x="1087961" y="412525"/>
+        <a:ext cx="3236811" cy="2157873"/>
       </dsp:txXfrm>
     </dsp:sp>
-    <dsp:sp modelId="{B4BBFC7D-8AE3-40C8-B52A-B08272CE10D6}">
+    <dsp:sp modelId="{A58F9F6B-5F2D-4DE4-961F-8C0DF1404A32}">
       <dsp:nvSpPr>
         <dsp:cNvPr id="0" name=""/>
         <dsp:cNvSpPr/>
       </dsp:nvSpPr>
       <dsp:spPr>
         <a:xfrm>
-          <a:off x="1253" y="3364342"/>
-          <a:ext cx="4888306" cy="72"/>
+          <a:off x="4864240" y="412525"/>
+          <a:ext cx="5394684" cy="2157873"/>
         </a:xfrm>
-        <a:prstGeom prst="rect">
+        <a:prstGeom prst="chevron">
           <a:avLst/>
         </a:prstGeom>
         <a:gradFill rotWithShape="0">
           <a:gsLst>
             <a:gs pos="0">
-              <a:schemeClr val="accent5">
+              <a:schemeClr val="accent1">
                 <a:hueOff val="0"/>
                 <a:satOff val="0"/>
-                <a:lumOff val="-7451"/>
+                <a:lumOff val="0"/>
                 <a:alphaOff val="0"/>
                 <a:satMod val="103000"/>
                 <a:lumMod val="102000"/>
@@ -2364,10 +2171,10 @@
               </a:schemeClr>
             </a:gs>
             <a:gs pos="50000">
-              <a:schemeClr val="accent5">
+              <a:schemeClr val="accent1">
                 <a:hueOff val="0"/>
                 <a:satOff val="0"/>
-                <a:lumOff val="-7451"/>
+                <a:lumOff val="0"/>
                 <a:alphaOff val="0"/>
                 <a:satMod val="110000"/>
                 <a:lumMod val="100000"/>
@@ -2375,10 +2182,10 @@
               </a:schemeClr>
             </a:gs>
             <a:gs pos="100000">
-              <a:schemeClr val="accent5">
+              <a:schemeClr val="accent1">
                 <a:hueOff val="0"/>
                 <a:satOff val="0"/>
-                <a:lumOff val="-7451"/>
+                <a:lumOff val="0"/>
                 <a:alphaOff val="0"/>
                 <a:lumMod val="99000"/>
                 <a:satMod val="120000"/>
@@ -2388,183 +2195,13 @@
           </a:gsLst>
           <a:lin ang="5400000" scaled="0"/>
         </a:gradFill>
-        <a:ln w="6350" cap="flat" cmpd="sng" algn="ctr">
-          <a:solidFill>
-            <a:schemeClr val="accent5">
-              <a:hueOff val="0"/>
-              <a:satOff val="0"/>
-              <a:lumOff val="-7451"/>
-              <a:alphaOff val="0"/>
-            </a:schemeClr>
-          </a:solidFill>
-          <a:prstDash val="solid"/>
-          <a:miter lim="800000"/>
+        <a:ln>
+          <a:noFill/>
         </a:ln>
         <a:effectLst/>
       </dsp:spPr>
       <dsp:style>
-        <a:lnRef idx="1">
-          <a:scrgbClr r="0" g="0" b="0"/>
-        </a:lnRef>
-        <a:fillRef idx="3">
-          <a:scrgbClr r="0" g="0" b="0"/>
-        </a:fillRef>
-        <a:effectRef idx="2">
-          <a:scrgbClr r="0" g="0" b="0"/>
-        </a:effectRef>
-        <a:fontRef idx="minor">
-          <a:schemeClr val="lt1"/>
-        </a:fontRef>
-      </dsp:style>
-    </dsp:sp>
-    <dsp:sp modelId="{0E41AABF-E455-435B-AC1C-B99DE40A2B1D}">
-      <dsp:nvSpPr>
-        <dsp:cNvPr id="0" name=""/>
-        <dsp:cNvSpPr/>
-      </dsp:nvSpPr>
-      <dsp:spPr>
-        <a:xfrm>
-          <a:off x="5378390" y="0"/>
-          <a:ext cx="4888306" cy="3364414"/>
-        </a:xfrm>
-        <a:prstGeom prst="rect">
-          <a:avLst/>
-        </a:prstGeom>
-        <a:solidFill>
-          <a:schemeClr val="accent5">
-            <a:tint val="40000"/>
-            <a:alpha val="90000"/>
-            <a:hueOff val="0"/>
-            <a:satOff val="0"/>
-            <a:lumOff val="-5152"/>
-            <a:alphaOff val="0"/>
-          </a:schemeClr>
-        </a:solidFill>
-        <a:ln w="6350" cap="flat" cmpd="sng" algn="ctr">
-          <a:solidFill>
-            <a:schemeClr val="accent5">
-              <a:tint val="40000"/>
-              <a:alpha val="90000"/>
-              <a:hueOff val="0"/>
-              <a:satOff val="0"/>
-              <a:lumOff val="-5152"/>
-              <a:alphaOff val="0"/>
-            </a:schemeClr>
-          </a:solidFill>
-          <a:prstDash val="solid"/>
-          <a:miter lim="800000"/>
-        </a:ln>
-        <a:effectLst/>
-      </dsp:spPr>
-      <dsp:style>
-        <a:lnRef idx="1">
-          <a:scrgbClr r="0" g="0" b="0"/>
-        </a:lnRef>
-        <a:fillRef idx="1">
-          <a:scrgbClr r="0" g="0" b="0"/>
-        </a:fillRef>
-        <a:effectRef idx="0">
-          <a:scrgbClr r="0" g="0" b="0"/>
-        </a:effectRef>
-        <a:fontRef idx="minor"/>
-      </dsp:style>
-      <dsp:txBody>
-        <a:bodyPr spcFirstLastPara="0" vert="horz" wrap="square" lIns="381111" tIns="330200" rIns="381111" bIns="330200" numCol="1" spcCol="1270" anchor="t" anchorCtr="0">
-          <a:noAutofit/>
-        </a:bodyPr>
-        <a:lstStyle/>
-        <a:p>
-          <a:pPr marL="0" lvl="0" indent="0" algn="l" defTabSz="1155700">
-            <a:lnSpc>
-              <a:spcPct val="90000"/>
-            </a:lnSpc>
-            <a:spcBef>
-              <a:spcPct val="0"/>
-            </a:spcBef>
-            <a:spcAft>
-              <a:spcPct val="35000"/>
-            </a:spcAft>
-            <a:buNone/>
-          </a:pPr>
-          <a:r>
-            <a:rPr lang="pt-BR" sz="2600" kern="1200"/>
-            <a:t>Conseguir me amadurecer perante da situação;</a:t>
-          </a:r>
-          <a:endParaRPr lang="en-US" sz="2600" kern="1200"/>
-        </a:p>
-      </dsp:txBody>
-      <dsp:txXfrm>
-        <a:off x="5378390" y="1278477"/>
-        <a:ext cx="4888306" cy="2018648"/>
-      </dsp:txXfrm>
-    </dsp:sp>
-    <dsp:sp modelId="{FE701603-51CF-41DC-956B-B8DB008A9EB6}">
-      <dsp:nvSpPr>
-        <dsp:cNvPr id="0" name=""/>
-        <dsp:cNvSpPr/>
-      </dsp:nvSpPr>
-      <dsp:spPr>
-        <a:xfrm>
-          <a:off x="7317881" y="336441"/>
-          <a:ext cx="1009324" cy="1009324"/>
-        </a:xfrm>
-        <a:prstGeom prst="ellipse">
-          <a:avLst/>
-        </a:prstGeom>
-        <a:gradFill rotWithShape="0">
-          <a:gsLst>
-            <a:gs pos="0">
-              <a:schemeClr val="accent5">
-                <a:hueOff val="0"/>
-                <a:satOff val="0"/>
-                <a:lumOff val="-14902"/>
-                <a:alphaOff val="0"/>
-                <a:satMod val="103000"/>
-                <a:lumMod val="102000"/>
-                <a:tint val="94000"/>
-              </a:schemeClr>
-            </a:gs>
-            <a:gs pos="50000">
-              <a:schemeClr val="accent5">
-                <a:hueOff val="0"/>
-                <a:satOff val="0"/>
-                <a:lumOff val="-14902"/>
-                <a:alphaOff val="0"/>
-                <a:satMod val="110000"/>
-                <a:lumMod val="100000"/>
-                <a:shade val="100000"/>
-              </a:schemeClr>
-            </a:gs>
-            <a:gs pos="100000">
-              <a:schemeClr val="accent5">
-                <a:hueOff val="0"/>
-                <a:satOff val="0"/>
-                <a:lumOff val="-14902"/>
-                <a:alphaOff val="0"/>
-                <a:lumMod val="99000"/>
-                <a:satMod val="120000"/>
-                <a:shade val="78000"/>
-              </a:schemeClr>
-            </a:gs>
-          </a:gsLst>
-          <a:lin ang="5400000" scaled="0"/>
-        </a:gradFill>
-        <a:ln w="6350" cap="flat" cmpd="sng" algn="ctr">
-          <a:solidFill>
-            <a:schemeClr val="accent5">
-              <a:hueOff val="0"/>
-              <a:satOff val="0"/>
-              <a:lumOff val="-14902"/>
-              <a:alphaOff val="0"/>
-            </a:schemeClr>
-          </a:solidFill>
-          <a:prstDash val="solid"/>
-          <a:miter lim="800000"/>
-        </a:ln>
-        <a:effectLst/>
-      </dsp:spPr>
-      <dsp:style>
-        <a:lnRef idx="1">
+        <a:lnRef idx="0">
           <a:scrgbClr r="0" g="0" b="0"/>
         </a:lnRef>
         <a:fillRef idx="3">
@@ -2578,12 +2215,12 @@
         </a:fontRef>
       </dsp:style>
       <dsp:txBody>
-        <a:bodyPr spcFirstLastPara="0" vert="horz" wrap="square" lIns="78691" tIns="12700" rIns="78691" bIns="12700" numCol="1" spcCol="1270" anchor="ctr" anchorCtr="0">
+        <a:bodyPr spcFirstLastPara="0" vert="horz" wrap="square" lIns="156020" tIns="52007" rIns="52007" bIns="52007" numCol="1" spcCol="1270" anchor="ctr" anchorCtr="0">
           <a:noAutofit/>
         </a:bodyPr>
         <a:lstStyle/>
         <a:p>
-          <a:pPr marL="0" lvl="0" indent="0" algn="ctr" defTabSz="2133600">
+          <a:pPr marL="0" lvl="0" indent="0" algn="ctr" defTabSz="1733550">
             <a:lnSpc>
               <a:spcPct val="90000"/>
             </a:lnSpc>
@@ -2596,95 +2233,16 @@
             <a:buNone/>
           </a:pPr>
           <a:r>
-            <a:rPr lang="en-US" sz="4800" kern="1200"/>
-            <a:t>2</a:t>
+            <a:rPr lang="pt-BR" sz="3900" kern="1200"/>
+            <a:t>Conseguir terminar um projeto full-Stack;</a:t>
           </a:r>
+          <a:endParaRPr lang="en-US" sz="3900" kern="1200" dirty="0"/>
         </a:p>
       </dsp:txBody>
       <dsp:txXfrm>
-        <a:off x="7465693" y="484253"/>
-        <a:ext cx="713700" cy="713700"/>
+        <a:off x="5943177" y="412525"/>
+        <a:ext cx="3236811" cy="2157873"/>
       </dsp:txXfrm>
-    </dsp:sp>
-    <dsp:sp modelId="{693E7664-CAB8-441E-86AD-B4B3E3392F6E}">
-      <dsp:nvSpPr>
-        <dsp:cNvPr id="0" name=""/>
-        <dsp:cNvSpPr/>
-      </dsp:nvSpPr>
-      <dsp:spPr>
-        <a:xfrm>
-          <a:off x="5378390" y="3364342"/>
-          <a:ext cx="4888306" cy="72"/>
-        </a:xfrm>
-        <a:prstGeom prst="rect">
-          <a:avLst/>
-        </a:prstGeom>
-        <a:gradFill rotWithShape="0">
-          <a:gsLst>
-            <a:gs pos="0">
-              <a:schemeClr val="accent5">
-                <a:hueOff val="0"/>
-                <a:satOff val="0"/>
-                <a:lumOff val="-22353"/>
-                <a:alphaOff val="0"/>
-                <a:satMod val="103000"/>
-                <a:lumMod val="102000"/>
-                <a:tint val="94000"/>
-              </a:schemeClr>
-            </a:gs>
-            <a:gs pos="50000">
-              <a:schemeClr val="accent5">
-                <a:hueOff val="0"/>
-                <a:satOff val="0"/>
-                <a:lumOff val="-22353"/>
-                <a:alphaOff val="0"/>
-                <a:satMod val="110000"/>
-                <a:lumMod val="100000"/>
-                <a:shade val="100000"/>
-              </a:schemeClr>
-            </a:gs>
-            <a:gs pos="100000">
-              <a:schemeClr val="accent5">
-                <a:hueOff val="0"/>
-                <a:satOff val="0"/>
-                <a:lumOff val="-22353"/>
-                <a:alphaOff val="0"/>
-                <a:lumMod val="99000"/>
-                <a:satMod val="120000"/>
-                <a:shade val="78000"/>
-              </a:schemeClr>
-            </a:gs>
-          </a:gsLst>
-          <a:lin ang="5400000" scaled="0"/>
-        </a:gradFill>
-        <a:ln w="6350" cap="flat" cmpd="sng" algn="ctr">
-          <a:solidFill>
-            <a:schemeClr val="accent5">
-              <a:hueOff val="0"/>
-              <a:satOff val="0"/>
-              <a:lumOff val="-22353"/>
-              <a:alphaOff val="0"/>
-            </a:schemeClr>
-          </a:solidFill>
-          <a:prstDash val="solid"/>
-          <a:miter lim="800000"/>
-        </a:ln>
-        <a:effectLst/>
-      </dsp:spPr>
-      <dsp:style>
-        <a:lnRef idx="1">
-          <a:scrgbClr r="0" g="0" b="0"/>
-        </a:lnRef>
-        <a:fillRef idx="3">
-          <a:scrgbClr r="0" g="0" b="0"/>
-        </a:fillRef>
-        <a:effectRef idx="2">
-          <a:scrgbClr r="0" g="0" b="0"/>
-        </a:effectRef>
-        <a:fontRef idx="minor">
-          <a:schemeClr val="lt1"/>
-        </a:fontRef>
-      </dsp:style>
     </dsp:sp>
   </dsp:spTree>
 </dsp:drawing>
@@ -3162,79 +2720,15 @@
 </file>
 
 <file path=ppt/diagrams/layout1.xml><?xml version="1.0" encoding="utf-8"?>
-<dgm:layoutDef xmlns:dgm="http://schemas.openxmlformats.org/drawingml/2006/diagram" xmlns:a="http://schemas.openxmlformats.org/drawingml/2006/main" uniqueId="urn:microsoft.com/office/officeart/2016/7/layout/BasicLinearProcessNumbered">
-  <dgm:title val="Basic Linear Process Numbered"/>
-  <dgm:desc val="Used to show a progression; a timeline; sequential steps in a task, process, or workflow; or to emphasize movement or direction. Automatic numbers have been introduced to show the steps of the process which appears in a circle. Level 1 and Level 2 text appear in a rectangle."/>
+<dgm:layoutDef xmlns:dgm="http://schemas.openxmlformats.org/drawingml/2006/diagram" xmlns:a="http://schemas.openxmlformats.org/drawingml/2006/main" uniqueId="urn:microsoft.com/office/officeart/2005/8/layout/chevron1">
+  <dgm:title val=""/>
+  <dgm:desc val=""/>
   <dgm:catLst>
-    <dgm:cat type="process" pri="500"/>
+    <dgm:cat type="process" pri="9000"/>
   </dgm:catLst>
-  <dgm:sampData>
+  <dgm:sampData useDef="1">
     <dgm:dataModel>
-      <dgm:ptLst>
-        <dgm:pt modelId="0" type="doc"/>
-        <dgm:pt modelId="1">
-          <dgm:prSet phldr="1"/>
-        </dgm:pt>
-        <dgm:pt modelId="11">
-          <dgm:prSet phldr="1"/>
-        </dgm:pt>
-        <dgm:pt modelId="2">
-          <dgm:prSet phldr="1"/>
-        </dgm:pt>
-        <dgm:pt modelId="21">
-          <dgm:prSet phldr="1"/>
-        </dgm:pt>
-        <dgm:pt modelId="3">
-          <dgm:prSet phldr="1"/>
-        </dgm:pt>
-        <dgm:pt modelId="31">
-          <dgm:prSet phldr="1"/>
-        </dgm:pt>
-        <dgm:pt modelId="101" type="sibTrans" cxnId="4">
-          <dgm:prSet phldrT="1"/>
-          <dgm:t>
-            <a:bodyPr/>
-            <a:lstStyle/>
-            <a:p>
-              <a:r>
-                <a:t>1</a:t>
-              </a:r>
-            </a:p>
-          </dgm:t>
-        </dgm:pt>
-        <dgm:pt modelId="201" type="sibTrans" cxnId="5">
-          <dgm:prSet phldrT="2"/>
-          <dgm:t>
-            <a:bodyPr/>
-            <a:lstStyle/>
-            <a:p>
-              <a:r>
-                <a:t>2</a:t>
-              </a:r>
-            </a:p>
-          </dgm:t>
-        </dgm:pt>
-        <dgm:pt modelId="301" type="sibTrans" cxnId="6">
-          <dgm:prSet phldrT="3"/>
-          <dgm:t>
-            <a:bodyPr/>
-            <a:lstStyle/>
-            <a:p>
-              <a:r>
-                <a:t>3</a:t>
-              </a:r>
-            </a:p>
-          </dgm:t>
-        </dgm:pt>
-      </dgm:ptLst>
-      <dgm:cxnLst>
-        <dgm:cxn modelId="4" srcId="0" destId="1" srcOrd="0" destOrd="0" sibTransId="101"/>
-        <dgm:cxn modelId="5" srcId="0" destId="2" srcOrd="1" destOrd="0" sibTransId="201"/>
-        <dgm:cxn modelId="6" srcId="0" destId="3" srcOrd="2" destOrd="0" sibTransId="301"/>
-        <dgm:cxn modelId="13" srcId="1" destId="11" srcOrd="0" destOrd="0"/>
-        <dgm:cxn modelId="23" srcId="2" destId="21" srcOrd="0" destOrd="0"/>
-        <dgm:cxn modelId="33" srcId="3" destId="31" srcOrd="0" destOrd="0"/>
-      </dgm:cxnLst>
+      <dgm:ptLst/>
       <dgm:bg/>
       <dgm:whole/>
     </dgm:dataModel>
@@ -3244,15 +2738,11 @@
       <dgm:ptLst>
         <dgm:pt modelId="0" type="doc"/>
         <dgm:pt modelId="1"/>
-        <dgm:pt modelId="11"/>
         <dgm:pt modelId="2"/>
-        <dgm:pt modelId="21"/>
       </dgm:ptLst>
       <dgm:cxnLst>
-        <dgm:cxn modelId="4" srcId="0" destId="1" srcOrd="0" destOrd="0"/>
-        <dgm:cxn modelId="5" srcId="0" destId="2" srcOrd="1" destOrd="0"/>
-        <dgm:cxn modelId="13" srcId="1" destId="11" srcOrd="0" destOrd="0"/>
-        <dgm:cxn modelId="23" srcId="2" destId="21" srcOrd="0" destOrd="0"/>
+        <dgm:cxn modelId="3" srcId="0" destId="1" srcOrd="0" destOrd="0"/>
+        <dgm:cxn modelId="4" srcId="0" destId="2" srcOrd="1" destOrd="0"/>
       </dgm:cxnLst>
       <dgm:bg/>
       <dgm:whole/>
@@ -3263,23 +2753,15 @@
       <dgm:ptLst>
         <dgm:pt modelId="0" type="doc"/>
         <dgm:pt modelId="1"/>
-        <dgm:pt modelId="11"/>
         <dgm:pt modelId="2"/>
-        <dgm:pt modelId="21"/>
         <dgm:pt modelId="3"/>
-        <dgm:pt modelId="31"/>
         <dgm:pt modelId="4"/>
-        <dgm:pt modelId="41"/>
       </dgm:ptLst>
       <dgm:cxnLst>
         <dgm:cxn modelId="5" srcId="0" destId="1" srcOrd="0" destOrd="0"/>
         <dgm:cxn modelId="6" srcId="0" destId="2" srcOrd="1" destOrd="0"/>
         <dgm:cxn modelId="7" srcId="0" destId="3" srcOrd="2" destOrd="0"/>
         <dgm:cxn modelId="8" srcId="0" destId="4" srcOrd="3" destOrd="0"/>
-        <dgm:cxn modelId="13" srcId="1" destId="11" srcOrd="0" destOrd="0"/>
-        <dgm:cxn modelId="23" srcId="2" destId="21" srcOrd="0" destOrd="0"/>
-        <dgm:cxn modelId="33" srcId="3" destId="31" srcOrd="0" destOrd="0"/>
-        <dgm:cxn modelId="43" srcId="4" destId="41" srcOrd="0" destOrd="0"/>
       </dgm:cxnLst>
       <dgm:bg/>
       <dgm:whole/>
@@ -3287,154 +2769,236 @@
   </dgm:clrData>
   <dgm:layoutNode name="Name0">
     <dgm:varLst>
+      <dgm:dir/>
       <dgm:animLvl val="lvl"/>
       <dgm:resizeHandles val="exact"/>
     </dgm:varLst>
-    <dgm:alg type="lin">
-      <dgm:param type="linDir" val="fromL"/>
-      <dgm:param type="nodeVertAlign" val="t"/>
-    </dgm:alg>
+    <dgm:choose name="Name1">
+      <dgm:if name="Name2" func="var" arg="dir" op="equ" val="norm">
+        <dgm:alg type="lin"/>
+      </dgm:if>
+      <dgm:else name="Name3">
+        <dgm:alg type="lin">
+          <dgm:param type="linDir" val="fromR"/>
+        </dgm:alg>
+      </dgm:else>
+    </dgm:choose>
     <dgm:shape xmlns:r="http://schemas.openxmlformats.org/officeDocument/2006/relationships" r:blip="">
       <dgm:adjLst/>
     </dgm:shape>
     <dgm:presOf/>
-    <dgm:constrLst>
-      <dgm:constr type="h" for="ch" forName="compositeNode" refType="h"/>
-      <dgm:constr type="w" for="ch" forName="compositeNode" refType="w"/>
-      <dgm:constr type="w" for="des" forName="simulatedConn" refType="w" refFor="ch" refForName="compositeNode" fact="0.15"/>
-      <dgm:constr type="h" for="des" forName="simulatedConn" refType="w" refFor="des" refForName="simulatedConn"/>
-      <dgm:constr type="h" for="des" forName="vSp1" refType="w" refFor="ch" refForName="compositeNode" fact="0.8"/>
-      <dgm:constr type="h" for="des" forName="vSp2" refType="w" refFor="ch" refForName="compositeNode" fact="0.07"/>
-      <dgm:constr type="w" for="ch" forName="vProcSp" refType="w" refFor="des" refForName="simulatedConn" op="equ"/>
-      <dgm:constr type="h" for="ch" forName="vProcSp" refType="h" refFor="ch" refForName="compositeNode" op="equ"/>
-      <dgm:constr type="w" for="ch" forName="sibTrans" refType="w" refFor="ch" refForName="compositeNode" fact="0.1"/>
-      <dgm:constr type="primFontSz" for="des" forName="sibTransNodeCircle" op="equ"/>
-      <dgm:constr type="primFontSz" for="des" forName="nodeText" op="equ"/>
-      <dgm:constr type="h" for="des" forName="sibTransNodeCircle" op="equ"/>
-      <dgm:constr type="w" for="des" forName="sibTransNodeCircle" op="equ"/>
-    </dgm:constrLst>
-    <dgm:ruleLst>
-      <dgm:rule type="h" val="NaN" fact="1.2" max="NaN"/>
-    </dgm:ruleLst>
-    <dgm:forEach name="Name4" axis="ch" ptType="node">
-      <dgm:layoutNode name="compositeNode">
-        <dgm:varLst>
-          <dgm:bulletEnabled val="1"/>
-        </dgm:varLst>
-        <dgm:alg type="composite"/>
+    <dgm:choose name="Name4">
+      <dgm:if name="Name5" axis="des" func="maxDepth" op="gte" val="2">
         <dgm:constrLst>
-          <dgm:constr type="h" refType="w" op="lte" fact="1.4"/>
-          <dgm:constr type="w" for="ch" forName="bgRect" refType="w"/>
-          <dgm:constr type="h" for="ch" forName="bgRect" refType="h"/>
-          <dgm:constr type="t" for="ch" forName="bgRect"/>
-          <dgm:constr type="l" for="ch" forName="bgRect"/>
-          <dgm:constr type="h" for="ch" forName="sibTransNodeCircle" refType="h" refFor="ch" refForName="bgRect" fact="0.3"/>
-          <dgm:constr type="w" for="ch" forName="sibTransNodeCircle" refType="h" refFor="ch" refForName="sibTransNodeCircle"/>
-          <dgm:constr type="ctrX" for="ch" forName="sibTransNodeCircle" refType="w" fact="0.5"/>
-          <dgm:constr type="ctrY" for="ch" forName="sibTransNodeCircle" refType="h" fact="0.25"/>
-          <dgm:constr type="r" for="ch" forName="nodeText" refType="r" refFor="ch" refForName="bgRect"/>
-          <dgm:constr type="h" for="ch" forName="nodeText" refType="h" refFor="ch" refForName="bgRect" fact="0.6"/>
-          <dgm:constr type="t" for="ch" forName="nodeText" refType="h" refFor="ch" refForName="bgRect" fact="0.38"/>
-          <dgm:constr type="b" for="ch" forName="bottomLine" refType="b" refFor="ch" refForName="bgRect"/>
-          <dgm:constr type="w" for="ch" forName="bottomLine" refType="w" refFor="ch" refForName="bgRect"/>
-          <dgm:constr type="h" for="ch" forName="bottomLine" val="0.002"/>
+          <dgm:constr type="h" for="ch" forName="composite" refType="h"/>
+          <dgm:constr type="w" for="ch" forName="composite" refType="w"/>
+          <dgm:constr type="w" for="des" forName="parTx"/>
+          <dgm:constr type="h" for="des" forName="parTx" op="equ"/>
+          <dgm:constr type="w" for="des" forName="desTx"/>
+          <dgm:constr type="h" for="des" forName="desTx" op="equ"/>
+          <dgm:constr type="primFontSz" for="des" forName="parTx" val="65"/>
+          <dgm:constr type="secFontSz" for="des" forName="desTx" refType="primFontSz" refFor="des" refForName="parTx" op="equ"/>
+          <dgm:constr type="h" for="des" forName="parTx" refType="primFontSz" refFor="des" refForName="parTx" fact="1.5"/>
+          <dgm:constr type="h" for="des" forName="desTx" refType="primFontSz" refFor="des" refForName="parTx" fact="0.5"/>
+          <dgm:constr type="w" for="ch" forName="space" op="equ" val="-6"/>
+        </dgm:constrLst>
+        <dgm:ruleLst>
+          <dgm:rule type="w" for="ch" forName="composite" val="0" fact="NaN" max="NaN"/>
+          <dgm:rule type="primFontSz" for="des" forName="parTx" val="5" fact="NaN" max="NaN"/>
+        </dgm:ruleLst>
+        <dgm:forEach name="Name6" axis="ch" ptType="node">
+          <dgm:layoutNode name="composite">
+            <dgm:alg type="composite"/>
+            <dgm:shape xmlns:r="http://schemas.openxmlformats.org/officeDocument/2006/relationships" r:blip="">
+              <dgm:adjLst/>
+            </dgm:shape>
+            <dgm:presOf/>
+            <dgm:choose name="Name7">
+              <dgm:if name="Name8" func="var" arg="dir" op="equ" val="norm">
+                <dgm:constrLst>
+                  <dgm:constr type="l" for="ch" forName="parTx"/>
+                  <dgm:constr type="w" for="ch" forName="parTx" refType="w"/>
+                  <dgm:constr type="t" for="ch" forName="parTx"/>
+                  <dgm:constr type="l" for="ch" forName="desTx"/>
+                  <dgm:constr type="w" for="ch" forName="desTx" refType="w" refFor="ch" refForName="parTx" fact="0.8"/>
+                  <dgm:constr type="t" for="ch" forName="desTx" refType="h" refFor="ch" refForName="parTx" fact="1.125"/>
+                </dgm:constrLst>
+              </dgm:if>
+              <dgm:else name="Name9">
+                <dgm:constrLst>
+                  <dgm:constr type="l" for="ch" forName="parTx"/>
+                  <dgm:constr type="w" for="ch" forName="parTx" refType="w"/>
+                  <dgm:constr type="t" for="ch" forName="parTx"/>
+                  <dgm:constr type="l" for="ch" forName="desTx" refType="w" fact="0.2"/>
+                  <dgm:constr type="w" for="ch" forName="desTx" refType="w" refFor="ch" refForName="parTx" fact="0.8"/>
+                  <dgm:constr type="t" for="ch" forName="desTx" refType="h" refFor="ch" refForName="parTx" fact="1.125"/>
+                </dgm:constrLst>
+              </dgm:else>
+            </dgm:choose>
+            <dgm:ruleLst>
+              <dgm:rule type="h" val="INF" fact="NaN" max="NaN"/>
+            </dgm:ruleLst>
+            <dgm:layoutNode name="parTx">
+              <dgm:varLst>
+                <dgm:chMax val="0"/>
+                <dgm:chPref val="0"/>
+                <dgm:bulletEnabled val="1"/>
+              </dgm:varLst>
+              <dgm:alg type="tx"/>
+              <dgm:choose name="Name10">
+                <dgm:if name="Name11" func="var" arg="dir" op="equ" val="norm">
+                  <dgm:shape xmlns:r="http://schemas.openxmlformats.org/officeDocument/2006/relationships" type="chevron" r:blip="">
+                    <dgm:adjLst/>
+                  </dgm:shape>
+                </dgm:if>
+                <dgm:else name="Name12">
+                  <dgm:shape xmlns:r="http://schemas.openxmlformats.org/officeDocument/2006/relationships" rot="180" type="chevron" r:blip="">
+                    <dgm:adjLst/>
+                  </dgm:shape>
+                </dgm:else>
+              </dgm:choose>
+              <dgm:presOf axis="self" ptType="node"/>
+              <dgm:choose name="Name13">
+                <dgm:if name="Name14" func="var" arg="dir" op="equ" val="norm">
+                  <dgm:constrLst>
+                    <dgm:constr type="h" refType="w" op="lte" fact="0.4"/>
+                    <dgm:constr type="h"/>
+                    <dgm:constr type="tMarg" refType="primFontSz" fact="0.105"/>
+                    <dgm:constr type="bMarg" refType="primFontSz" fact="0.105"/>
+                    <dgm:constr type="lMarg" refType="primFontSz" fact="0.315"/>
+                    <dgm:constr type="rMarg" refType="primFontSz" fact="0.105"/>
+                  </dgm:constrLst>
+                </dgm:if>
+                <dgm:else name="Name15">
+                  <dgm:constrLst>
+                    <dgm:constr type="h" refType="w" op="lte" fact="0.4"/>
+                    <dgm:constr type="h"/>
+                    <dgm:constr type="tMarg" refType="primFontSz" fact="0.105"/>
+                    <dgm:constr type="bMarg" refType="primFontSz" fact="0.105"/>
+                    <dgm:constr type="lMarg" refType="primFontSz" fact="0.105"/>
+                    <dgm:constr type="rMarg" refType="primFontSz" fact="0.315"/>
+                  </dgm:constrLst>
+                </dgm:else>
+              </dgm:choose>
+              <dgm:ruleLst>
+                <dgm:rule type="h" val="INF" fact="NaN" max="NaN"/>
+              </dgm:ruleLst>
+            </dgm:layoutNode>
+            <dgm:layoutNode name="desTx" styleLbl="revTx">
+              <dgm:varLst>
+                <dgm:bulletEnabled val="1"/>
+              </dgm:varLst>
+              <dgm:alg type="tx">
+                <dgm:param type="stBulletLvl" val="1"/>
+              </dgm:alg>
+              <dgm:choose name="Name16">
+                <dgm:if name="Name17" axis="ch" ptType="node" func="cnt" op="gte" val="1">
+                  <dgm:shape xmlns:r="http://schemas.openxmlformats.org/officeDocument/2006/relationships" type="rect" r:blip="">
+                    <dgm:adjLst/>
+                  </dgm:shape>
+                </dgm:if>
+                <dgm:else name="Name18">
+                  <dgm:shape xmlns:r="http://schemas.openxmlformats.org/officeDocument/2006/relationships" type="rect" r:blip="" hideGeom="1">
+                    <dgm:adjLst/>
+                  </dgm:shape>
+                </dgm:else>
+              </dgm:choose>
+              <dgm:presOf axis="des" ptType="node"/>
+              <dgm:constrLst>
+                <dgm:constr type="secFontSz" val="65"/>
+                <dgm:constr type="primFontSz" refType="secFontSz"/>
+                <dgm:constr type="h"/>
+                <dgm:constr type="tMarg"/>
+                <dgm:constr type="bMarg"/>
+                <dgm:constr type="rMarg"/>
+                <dgm:constr type="lMarg"/>
+              </dgm:constrLst>
+              <dgm:ruleLst>
+                <dgm:rule type="h" val="INF" fact="NaN" max="NaN"/>
+              </dgm:ruleLst>
+            </dgm:layoutNode>
+          </dgm:layoutNode>
+          <dgm:forEach name="Name19" axis="followSib" ptType="sibTrans" cnt="1">
+            <dgm:layoutNode name="space">
+              <dgm:alg type="sp"/>
+              <dgm:shape xmlns:r="http://schemas.openxmlformats.org/officeDocument/2006/relationships" r:blip="">
+                <dgm:adjLst/>
+              </dgm:shape>
+              <dgm:presOf/>
+              <dgm:constrLst/>
+              <dgm:ruleLst/>
+            </dgm:layoutNode>
+          </dgm:forEach>
+        </dgm:forEach>
+      </dgm:if>
+      <dgm:else name="Name20">
+        <dgm:constrLst>
+          <dgm:constr type="w" for="ch" forName="parTxOnly" refType="w"/>
+          <dgm:constr type="h" for="des" forName="parTxOnly" op="equ"/>
+          <dgm:constr type="primFontSz" for="des" forName="parTxOnly" op="equ" val="65"/>
+          <dgm:constr type="w" for="ch" forName="parTxOnlySpace" refType="w" refFor="ch" refForName="parTxOnly" fact="-0.1"/>
         </dgm:constrLst>
         <dgm:ruleLst/>
-        <dgm:layoutNode name="bgRect" styleLbl="bgAccFollowNode1">
-          <dgm:alg type="sp"/>
-          <dgm:shape xmlns:r="http://schemas.openxmlformats.org/officeDocument/2006/relationships" type="rect" r:blip="">
-            <dgm:adjLst/>
-          </dgm:shape>
-          <dgm:presOf axis="self"/>
-          <dgm:constrLst/>
-          <dgm:ruleLst/>
-        </dgm:layoutNode>
-        <dgm:forEach name="Name19" axis="followSib" ptType="sibTrans" hideLastTrans="0" cnt="1">
-          <dgm:layoutNode name="sibTransNodeCircle" styleLbl="alignNode1">
+        <dgm:forEach name="Name21" axis="ch" ptType="node">
+          <dgm:layoutNode name="parTxOnly">
             <dgm:varLst>
               <dgm:chMax val="0"/>
-              <dgm:bulletEnabled/>
+              <dgm:chPref val="0"/>
+              <dgm:bulletEnabled val="1"/>
             </dgm:varLst>
-            <dgm:presOf axis="self" ptType="sibTrans"/>
-            <dgm:alg type="tx">
-              <dgm:param type="txAnchorVert" val="mid"/>
-              <dgm:param type="txAnchorHorzCh" val="ctr"/>
-            </dgm:alg>
-            <dgm:shape xmlns:r="http://schemas.openxmlformats.org/officeDocument/2006/relationships" type="ellipse" r:blip="">
-              <dgm:adjLst/>
-            </dgm:shape>
-            <dgm:constrLst>
-              <dgm:constr type="w" refType="h" op="lte"/>
-              <dgm:constr type="primFontSz" val="48"/>
-              <dgm:constr type="tMarg" val="1"/>
-              <dgm:constr type="lMarg" refType="w" fact="0.221"/>
-              <dgm:constr type="rMarg" refType="w" fact="0.221"/>
-              <dgm:constr type="bMarg" val="1"/>
-            </dgm:constrLst>
+            <dgm:alg type="tx"/>
+            <dgm:choose name="Name22">
+              <dgm:if name="Name23" func="var" arg="dir" op="equ" val="norm">
+                <dgm:shape xmlns:r="http://schemas.openxmlformats.org/officeDocument/2006/relationships" type="chevron" r:blip="">
+                  <dgm:adjLst/>
+                </dgm:shape>
+              </dgm:if>
+              <dgm:else name="Name24">
+                <dgm:shape xmlns:r="http://schemas.openxmlformats.org/officeDocument/2006/relationships" rot="180" type="chevron" r:blip="">
+                  <dgm:adjLst/>
+                </dgm:shape>
+              </dgm:else>
+            </dgm:choose>
+            <dgm:presOf axis="self" ptType="node"/>
+            <dgm:choose name="Name25">
+              <dgm:if name="Name26" func="var" arg="dir" op="equ" val="norm">
+                <dgm:constrLst>
+                  <dgm:constr type="h" refType="w" op="equ" fact="0.4"/>
+                  <dgm:constr type="tMarg" refType="primFontSz" fact="0.105"/>
+                  <dgm:constr type="bMarg" refType="primFontSz" fact="0.105"/>
+                  <dgm:constr type="lMarg" refType="primFontSz" fact="0.315"/>
+                  <dgm:constr type="rMarg" refType="primFontSz" fact="0.105"/>
+                </dgm:constrLst>
+              </dgm:if>
+              <dgm:else name="Name27">
+                <dgm:constrLst>
+                  <dgm:constr type="h" refType="w" op="equ" fact="0.4"/>
+                  <dgm:constr type="tMarg" refType="primFontSz" fact="0.105"/>
+                  <dgm:constr type="bMarg" refType="primFontSz" fact="0.105"/>
+                  <dgm:constr type="lMarg" refType="primFontSz" fact="0.105"/>
+                  <dgm:constr type="rMarg" refType="primFontSz" fact="0.315"/>
+                </dgm:constrLst>
+              </dgm:else>
+            </dgm:choose>
             <dgm:ruleLst>
-              <dgm:rule type="primFontSz" val="14" fact="NaN" max="NaN"/>
+              <dgm:rule type="primFontSz" val="5" fact="NaN" max="NaN"/>
             </dgm:ruleLst>
           </dgm:layoutNode>
+          <dgm:forEach name="Name28" axis="followSib" ptType="sibTrans" cnt="1">
+            <dgm:layoutNode name="parTxOnlySpace">
+              <dgm:alg type="sp"/>
+              <dgm:shape xmlns:r="http://schemas.openxmlformats.org/officeDocument/2006/relationships" r:blip="">
+                <dgm:adjLst/>
+              </dgm:shape>
+              <dgm:presOf/>
+              <dgm:constrLst/>
+              <dgm:ruleLst/>
+            </dgm:layoutNode>
+          </dgm:forEach>
         </dgm:forEach>
-        <dgm:layoutNode name="bottomLine" styleLbl="alignNode1">
-          <dgm:varLst/>
-          <dgm:presOf/>
-          <dgm:alg type="sp"/>
-          <dgm:shape xmlns:r="http://schemas.openxmlformats.org/officeDocument/2006/relationships" type="rect" r:blip="">
-            <dgm:adjLst/>
-          </dgm:shape>
-          <dgm:constrLst/>
-          <dgm:ruleLst/>
-        </dgm:layoutNode>
-        <dgm:layoutNode name="nodeText" styleLbl="bgAccFollowNode1" moveWith="bgRect">
-          <dgm:varLst>
-            <dgm:bulletEnabled val="1"/>
-          </dgm:varLst>
-          <dgm:alg type="tx">
-            <dgm:param type="parTxLTRAlign" val="l"/>
-            <dgm:param type="parTxRTLAlign" val="r"/>
-            <dgm:param type="txAnchorVert" val="t"/>
-          </dgm:alg>
-          <dgm:shape xmlns:r="http://schemas.openxmlformats.org/officeDocument/2006/relationships" type="rect" r:blip="" zOrderOff="-1" hideGeom="1">
-            <dgm:adjLst/>
-          </dgm:shape>
-          <dgm:presOf axis="desOrSelf" ptType="node"/>
-          <dgm:constrLst>
-            <dgm:constr type="primFontSz" val="26"/>
-            <dgm:constr type="tMarg" val="26"/>
-            <dgm:constr type="lMarg" refType="w" fact="0.221"/>
-            <dgm:constr type="rMarg" refType="w" fact="0.221"/>
-            <dgm:constr type="bMarg" val="26"/>
-          </dgm:constrLst>
-          <dgm:ruleLst>
-            <dgm:rule type="primFontSz" val="11" fact="NaN" max="NaN"/>
-          </dgm:ruleLst>
-        </dgm:layoutNode>
-      </dgm:layoutNode>
-      <dgm:forEach name="Name14" axis="followSib" ptType="sibTrans" cnt="1">
-        <dgm:layoutNode name="sibTrans">
-          <dgm:alg type="sp"/>
-          <dgm:shape xmlns:r="http://schemas.openxmlformats.org/officeDocument/2006/relationships" r:blip="">
-            <dgm:adjLst/>
-          </dgm:shape>
-          <dgm:presOf/>
-          <dgm:constrLst/>
-          <dgm:ruleLst/>
-        </dgm:layoutNode>
-      </dgm:forEach>
-    </dgm:forEach>
+      </dgm:else>
+    </dgm:choose>
   </dgm:layoutNode>
-  <dgm:extLst>
-    <a:ext uri="{4F341089-5ED1-44EC-B178-C955D00A3D55}">
-      <dgm1611:autoBuNodeInfoLst xmlns:dgm1611="http://schemas.microsoft.com/office/drawing/2016/11/diagram">
-        <dgm1611:autoBuNodeInfo lvl="1" ptType="sibTrans">
-          <dgm1611:buPr prefix="" leadZeros="0">
-            <a:buAutoNum type="arabicParenBoth"/>
-          </dgm1611:buPr>
-        </dgm1611:autoBuNodeInfo>
-      </dgm1611:autoBuNodeInfoLst>
-    </a:ext>
-  </dgm:extLst>
 </dgm:layoutDef>
 </file>
 
@@ -6291,7 +5855,7 @@
             <a:fld id="{A37D6D71-8B28-4ED6-B932-04B197003D23}" type="datetimeFigureOut">
               <a:rPr lang="en-US" smtClean="0"/>
               <a:pPr algn="r"/>
-              <a:t>11/30/2023</a:t>
+              <a:t>12/1/2023</a:t>
             </a:fld>
             <a:endParaRPr lang="en-US" dirty="0"/>
           </a:p>
@@ -6513,7 +6077,7 @@
             <a:fld id="{A37D6D71-8B28-4ED6-B932-04B197003D23}" type="datetimeFigureOut">
               <a:rPr lang="en-US" smtClean="0"/>
               <a:pPr algn="r"/>
-              <a:t>11/30/2023</a:t>
+              <a:t>12/1/2023</a:t>
             </a:fld>
             <a:endParaRPr lang="en-US" dirty="0"/>
           </a:p>
@@ -6796,7 +6360,7 @@
             <a:fld id="{A37D6D71-8B28-4ED6-B932-04B197003D23}" type="datetimeFigureOut">
               <a:rPr lang="en-US" smtClean="0"/>
               <a:pPr algn="r"/>
-              <a:t>11/30/2023</a:t>
+              <a:t>12/1/2023</a:t>
             </a:fld>
             <a:endParaRPr lang="en-US" dirty="0"/>
           </a:p>
@@ -7010,7 +6574,7 @@
             <a:fld id="{A37D6D71-8B28-4ED6-B932-04B197003D23}" type="datetimeFigureOut">
               <a:rPr lang="en-US" smtClean="0"/>
               <a:pPr algn="r"/>
-              <a:t>11/30/2023</a:t>
+              <a:t>12/1/2023</a:t>
             </a:fld>
             <a:endParaRPr lang="en-US" dirty="0"/>
           </a:p>
@@ -7348,7 +6912,7 @@
             <a:fld id="{A37D6D71-8B28-4ED6-B932-04B197003D23}" type="datetimeFigureOut">
               <a:rPr lang="en-US" smtClean="0"/>
               <a:pPr algn="r"/>
-              <a:t>11/30/2023</a:t>
+              <a:t>12/1/2023</a:t>
             </a:fld>
             <a:endParaRPr lang="en-US" dirty="0"/>
           </a:p>
@@ -7623,7 +7187,7 @@
             <a:fld id="{A37D6D71-8B28-4ED6-B932-04B197003D23}" type="datetimeFigureOut">
               <a:rPr lang="en-US" smtClean="0"/>
               <a:pPr algn="r"/>
-              <a:t>11/30/2023</a:t>
+              <a:t>12/1/2023</a:t>
             </a:fld>
             <a:endParaRPr lang="en-US" dirty="0"/>
           </a:p>
@@ -8012,7 +7576,7 @@
             <a:fld id="{A37D6D71-8B28-4ED6-B932-04B197003D23}" type="datetimeFigureOut">
               <a:rPr lang="en-US" smtClean="0"/>
               <a:pPr algn="r"/>
-              <a:t>11/30/2023</a:t>
+              <a:t>12/1/2023</a:t>
             </a:fld>
             <a:endParaRPr lang="en-US" dirty="0"/>
           </a:p>
@@ -8189,7 +7753,7 @@
             <a:fld id="{A37D6D71-8B28-4ED6-B932-04B197003D23}" type="datetimeFigureOut">
               <a:rPr lang="en-US" smtClean="0"/>
               <a:pPr algn="r"/>
-              <a:t>11/30/2023</a:t>
+              <a:t>12/1/2023</a:t>
             </a:fld>
             <a:endParaRPr lang="en-US" dirty="0"/>
           </a:p>
@@ -8310,7 +7874,7 @@
             <a:fld id="{A37D6D71-8B28-4ED6-B932-04B197003D23}" type="datetimeFigureOut">
               <a:rPr lang="en-US" smtClean="0"/>
               <a:pPr algn="r"/>
-              <a:t>11/30/2023</a:t>
+              <a:t>12/1/2023</a:t>
             </a:fld>
             <a:endParaRPr lang="en-US" dirty="0"/>
           </a:p>
@@ -8595,7 +8159,7 @@
             <a:fld id="{A37D6D71-8B28-4ED6-B932-04B197003D23}" type="datetimeFigureOut">
               <a:rPr lang="en-US" smtClean="0"/>
               <a:pPr algn="r"/>
-              <a:t>11/30/2023</a:t>
+              <a:t>12/1/2023</a:t>
             </a:fld>
             <a:endParaRPr lang="en-US" dirty="0"/>
           </a:p>
@@ -8896,7 +8460,7 @@
             <a:fld id="{A37D6D71-8B28-4ED6-B932-04B197003D23}" type="datetimeFigureOut">
               <a:rPr lang="en-US" smtClean="0"/>
               <a:pPr algn="r"/>
-              <a:t>11/30/2023</a:t>
+              <a:t>12/1/2023</a:t>
             </a:fld>
             <a:endParaRPr lang="en-US" dirty="0"/>
           </a:p>
@@ -9244,7 +8808,7 @@
             <a:fld id="{A37D6D71-8B28-4ED6-B932-04B197003D23}" type="datetimeFigureOut">
               <a:rPr lang="en-US" smtClean="0"/>
               <a:pPr algn="r"/>
-              <a:t>11/30/2023</a:t>
+              <a:t>12/1/2023</a:t>
             </a:fld>
             <a:endParaRPr lang="en-US" spc="50" dirty="0"/>
           </a:p>
@@ -9957,7 +9521,7 @@
                 </a:solidFill>
                 <a:effectLst/>
               </a:rPr>
-              <a:t>Antonio Gonçalves Sousa - 1ADS – A</a:t>
+              <a:t>Antonio Gonçalves Sousa - 1ADSA</a:t>
             </a:r>
             <a:endParaRPr lang="pt-BR" sz="3600" dirty="0">
               <a:solidFill>
@@ -10005,9 +9569,9 @@
           <a:chExt cx="0" cy="0"/>
         </a:xfrm>
       </p:grpSpPr>
-      <p:sp useBgFill="1">
+      <p:sp>
         <p:nvSpPr>
-          <p:cNvPr id="9" name="Rectangle 8">
+          <p:cNvPr id="16" name="Rectangle 15">
             <a:extLst>
               <a:ext uri="{FF2B5EF4-FFF2-40B4-BE49-F238E27FC236}">
                 <a16:creationId xmlns:a16="http://schemas.microsoft.com/office/drawing/2014/main" id="{EB6D1D7F-141C-4D8E-BFBA-D95B68E16385}"/>
@@ -10032,66 +9596,6 @@
           <a:xfrm>
             <a:off x="1524" y="0"/>
             <a:ext cx="12188952" cy="6858000"/>
-          </a:xfrm>
-          <a:prstGeom prst="rect">
-            <a:avLst/>
-          </a:prstGeom>
-          <a:ln>
-            <a:noFill/>
-          </a:ln>
-        </p:spPr>
-        <p:style>
-          <a:lnRef idx="2">
-            <a:schemeClr val="accent1">
-              <a:shade val="50000"/>
-            </a:schemeClr>
-          </a:lnRef>
-          <a:fillRef idx="1">
-            <a:schemeClr val="accent1"/>
-          </a:fillRef>
-          <a:effectRef idx="0">
-            <a:schemeClr val="accent1"/>
-          </a:effectRef>
-          <a:fontRef idx="minor">
-            <a:schemeClr val="lt1"/>
-          </a:fontRef>
-        </p:style>
-        <p:txBody>
-          <a:bodyPr rtlCol="0" anchor="ctr"/>
-          <a:lstStyle/>
-          <a:p>
-            <a:pPr algn="ctr"/>
-            <a:endParaRPr lang="en-US"/>
-          </a:p>
-        </p:txBody>
-      </p:sp>
-      <p:sp>
-        <p:nvSpPr>
-          <p:cNvPr id="11" name="Rectangle 10">
-            <a:extLst>
-              <a:ext uri="{FF2B5EF4-FFF2-40B4-BE49-F238E27FC236}">
-                <a16:creationId xmlns:a16="http://schemas.microsoft.com/office/drawing/2014/main" id="{245B42B6-26F8-4E25-839B-FB38F13BEFFC}"/>
-              </a:ext>
-              <a:ext uri="{C183D7F6-B498-43B3-948B-1728B52AA6E4}">
-                <adec:decorative xmlns:adec="http://schemas.microsoft.com/office/drawing/2017/decorative" val="1"/>
-              </a:ext>
-            </a:extLst>
-          </p:cNvPr>
-          <p:cNvSpPr>
-            <a:spLocks noGrp="1" noRot="1" noChangeAspect="1" noMove="1" noResize="1" noEditPoints="1" noAdjustHandles="1" noChangeArrowheads="1" noChangeShapeType="1" noTextEdit="1"/>
-          </p:cNvSpPr>
-          <p:nvPr>
-            <p:extLst>
-              <p:ext uri="{386F3935-93C4-4BCD-93E2-E3B085C9AB24}">
-                <p16:designElem xmlns:p16="http://schemas.microsoft.com/office/powerpoint/2015/main" val="1"/>
-              </p:ext>
-            </p:extLst>
-          </p:nvPr>
-        </p:nvSpPr>
-        <p:spPr>
-          <a:xfrm>
-            <a:off x="0" y="0"/>
-            <a:ext cx="12192000" cy="2264989"/>
           </a:xfrm>
           <a:prstGeom prst="rect">
             <a:avLst/>
@@ -10164,6 +9668,69 @@
           </a:p>
         </p:txBody>
       </p:sp>
+      <p:sp>
+        <p:nvSpPr>
+          <p:cNvPr id="18" name="Rectangle 17">
+            <a:extLst>
+              <a:ext uri="{FF2B5EF4-FFF2-40B4-BE49-F238E27FC236}">
+                <a16:creationId xmlns:a16="http://schemas.microsoft.com/office/drawing/2014/main" id="{27248369-464E-49D1-91FC-BC34A50A66D2}"/>
+              </a:ext>
+              <a:ext uri="{C183D7F6-B498-43B3-948B-1728B52AA6E4}">
+                <adec:decorative xmlns:adec="http://schemas.microsoft.com/office/drawing/2017/decorative" val="1"/>
+              </a:ext>
+            </a:extLst>
+          </p:cNvPr>
+          <p:cNvSpPr>
+            <a:spLocks noGrp="1" noRot="1" noChangeAspect="1" noMove="1" noResize="1" noEditPoints="1" noAdjustHandles="1" noChangeArrowheads="1" noChangeShapeType="1" noTextEdit="1"/>
+          </p:cNvSpPr>
+          <p:nvPr>
+            <p:extLst>
+              <p:ext uri="{386F3935-93C4-4BCD-93E2-E3B085C9AB24}">
+                <p16:designElem xmlns:p16="http://schemas.microsoft.com/office/powerpoint/2015/main" val="1"/>
+              </p:ext>
+            </p:extLst>
+          </p:nvPr>
+        </p:nvSpPr>
+        <p:spPr>
+          <a:xfrm>
+            <a:off x="1524" y="2264989"/>
+            <a:ext cx="12188952" cy="3952189"/>
+          </a:xfrm>
+          <a:prstGeom prst="rect">
+            <a:avLst/>
+          </a:prstGeom>
+          <a:solidFill>
+            <a:schemeClr val="bg1"/>
+          </a:solidFill>
+          <a:ln>
+            <a:noFill/>
+          </a:ln>
+        </p:spPr>
+        <p:style>
+          <a:lnRef idx="2">
+            <a:schemeClr val="accent1">
+              <a:shade val="50000"/>
+            </a:schemeClr>
+          </a:lnRef>
+          <a:fillRef idx="1">
+            <a:schemeClr val="accent1"/>
+          </a:fillRef>
+          <a:effectRef idx="0">
+            <a:schemeClr val="accent1"/>
+          </a:effectRef>
+          <a:fontRef idx="minor">
+            <a:schemeClr val="lt1"/>
+          </a:fontRef>
+        </p:style>
+        <p:txBody>
+          <a:bodyPr rtlCol="0" anchor="ctr"/>
+          <a:lstStyle/>
+          <a:p>
+            <a:pPr algn="ctr"/>
+            <a:endParaRPr lang="en-US" dirty="0"/>
+          </a:p>
+        </p:txBody>
+      </p:sp>
       <p:graphicFrame>
         <p:nvGraphicFramePr>
           <p:cNvPr id="5" name="Espaço Reservado para Conteúdo 2">
@@ -10180,14 +9747,14 @@
             <p:ph idx="1"/>
             <p:extLst>
               <p:ext uri="{D42A27DB-BD31-4B8C-83A1-F6EECF244321}">
-                <p14:modId xmlns:p14="http://schemas.microsoft.com/office/powerpoint/2010/main" val="2094916657"/>
+                <p14:modId xmlns:p14="http://schemas.microsoft.com/office/powerpoint/2010/main" val="1350164339"/>
               </p:ext>
             </p:extLst>
           </p:nvPr>
         </p:nvGraphicFramePr>
         <p:xfrm>
-          <a:off x="960438" y="2745545"/>
-          <a:ext cx="10267950" cy="3364414"/>
+          <a:off x="960438" y="2749620"/>
+          <a:ext cx="10267950" cy="2982925"/>
         </p:xfrm>
         <a:graphic>
           <a:graphicData uri="http://schemas.openxmlformats.org/drawingml/2006/diagram">
@@ -10203,7 +9770,7 @@
     </p:extLst>
   </p:cSld>
   <p:clrMapOvr>
-    <a:masterClrMapping/>
+    <a:overrideClrMapping bg1="dk1" tx1="lt1" bg2="dk2" tx2="lt2" accent1="accent1" accent2="accent2" accent3="accent3" accent4="accent4" accent5="accent5" accent6="accent6" hlink="hlink" folHlink="folHlink"/>
   </p:clrMapOvr>
 </p:sld>
 </file>
@@ -10707,7 +10274,18 @@
                 <a:ea typeface="Calibri" panose="020F0502020204030204" pitchFamily="34" charset="0"/>
                 <a:cs typeface="Times New Roman" panose="02020603050405020304" pitchFamily="18" charset="0"/>
               </a:rPr>
-              <a:t>A saga “Velozes e Furiosos” é uma série cinematográfica que estreou em 2001, explorando o mundo da corrida de carros tunados e atividades criminosas relacionadas. Com seu início focado em corridas ilegais nas ruas de Los Angeles, a trama evoluiu para incluir missões globais, espionagem e uma rede intricada de personagens. </a:t>
+              <a:t>A saga “Velozes e Furiosos” é uma série cinematográfica que estreou em 2001, explorando o mundo da corrida de carros tunados.</a:t>
+            </a:r>
+          </a:p>
+          <a:p>
+            <a:r>
+              <a:rPr lang="pt-BR" sz="2400" dirty="0">
+                <a:effectLst/>
+                <a:latin typeface="Bahnschrift SemiBold SemiConden" panose="020B0502040204020203" pitchFamily="34" charset="0"/>
+                <a:ea typeface="Calibri" panose="020F0502020204030204" pitchFamily="34" charset="0"/>
+                <a:cs typeface="Times New Roman" panose="02020603050405020304" pitchFamily="18" charset="0"/>
+              </a:rPr>
+              <a:t> Com seu início focado em corridas ilegais nas ruas de Los Angeles, a trama evoluiu para incluir missões globais, espionagem e uma rede intricada de personagens. </a:t>
             </a:r>
             <a:endParaRPr lang="pt-BR" sz="2400" dirty="0"/>
           </a:p>
@@ -10753,7 +10331,7 @@
       </p:grpSpPr>
       <p:sp>
         <p:nvSpPr>
-          <p:cNvPr id="8" name="Rectangle 7">
+          <p:cNvPr id="10" name="Rectangle 9">
             <a:extLst>
               <a:ext uri="{FF2B5EF4-FFF2-40B4-BE49-F238E27FC236}">
                 <a16:creationId xmlns:a16="http://schemas.microsoft.com/office/drawing/2014/main" id="{EB6D1D7F-141C-4D8E-BFBA-D95B68E16385}"/>
@@ -10819,7 +10397,7 @@
           <p:cNvPr id="2" name="Título 1">
             <a:extLst>
               <a:ext uri="{FF2B5EF4-FFF2-40B4-BE49-F238E27FC236}">
-                <a16:creationId xmlns:a16="http://schemas.microsoft.com/office/drawing/2014/main" id="{9E56E99F-6694-1038-17D3-D8D160D576D0}"/>
+                <a16:creationId xmlns:a16="http://schemas.microsoft.com/office/drawing/2014/main" id="{923AD84C-BB9D-9A17-5C82-B6D6590A960F}"/>
               </a:ext>
             </a:extLst>
           </p:cNvPr>
@@ -10832,8 +10410,8 @@
         </p:nvSpPr>
         <p:spPr>
           <a:xfrm>
-            <a:off x="960120" y="317814"/>
-            <a:ext cx="10268712" cy="1700784"/>
+            <a:off x="4169664" y="329034"/>
+            <a:ext cx="3377029" cy="1700784"/>
           </a:xfrm>
         </p:spPr>
         <p:txBody>
@@ -10843,21 +10421,21 @@
           <a:lstStyle/>
           <a:p>
             <a:r>
-              <a:rPr lang="pt-BR" sz="5400" dirty="0">
+              <a:rPr lang="pt-BR" kern="100" dirty="0">
                 <a:effectLst/>
                 <a:latin typeface="PaybAck"/>
                 <a:ea typeface="Calibri" panose="020F0502020204030204" pitchFamily="34" charset="0"/>
                 <a:cs typeface="Times New Roman" panose="02020603050405020304" pitchFamily="18" charset="0"/>
               </a:rPr>
-              <a:t>Porque eu escolhi esse tema ?</a:t>
+              <a:t>Valores</a:t>
             </a:r>
-            <a:endParaRPr lang="pt-BR" sz="5400" dirty="0"/>
+            <a:endParaRPr lang="pt-BR" dirty="0"/>
           </a:p>
         </p:txBody>
       </p:sp>
       <p:sp>
         <p:nvSpPr>
-          <p:cNvPr id="10" name="Rectangle 9">
+          <p:cNvPr id="12" name="Rectangle 11">
             <a:extLst>
               <a:ext uri="{FF2B5EF4-FFF2-40B4-BE49-F238E27FC236}">
                 <a16:creationId xmlns:a16="http://schemas.microsoft.com/office/drawing/2014/main" id="{27248369-464E-49D1-91FC-BC34A50A66D2}"/>
@@ -10918,132 +10496,82 @@
           </a:p>
         </p:txBody>
       </p:sp>
-      <p:sp>
-        <p:nvSpPr>
-          <p:cNvPr id="3" name="Espaço Reservado para Conteúdo 2">
+      <p:pic>
+        <p:nvPicPr>
+          <p:cNvPr id="6" name="Imagem 5" descr="Desenho de uma placa&#10;&#10;Descrição gerada automaticamente com confiança média">
             <a:extLst>
               <a:ext uri="{FF2B5EF4-FFF2-40B4-BE49-F238E27FC236}">
-                <a16:creationId xmlns:a16="http://schemas.microsoft.com/office/drawing/2014/main" id="{4BAE1983-0F15-B8A6-EAFC-2789CC6EF20C}"/>
+                <a16:creationId xmlns:a16="http://schemas.microsoft.com/office/drawing/2014/main" id="{32A796F3-BBEF-0058-9FCD-5D3EBDBA4C1A}"/>
               </a:ext>
             </a:extLst>
           </p:cNvPr>
-          <p:cNvSpPr>
-            <a:spLocks noGrp="1"/>
-          </p:cNvSpPr>
-          <p:nvPr>
-            <p:ph idx="1"/>
-          </p:nvPr>
-        </p:nvSpPr>
+          <p:cNvPicPr>
+            <a:picLocks noChangeAspect="1"/>
+          </p:cNvPicPr>
+          <p:nvPr/>
+        </p:nvPicPr>
+        <p:blipFill>
+          <a:blip r:embed="rId2">
+            <a:extLst>
+              <a:ext uri="{28A0092B-C50C-407E-A947-70E740481C1C}">
+                <a14:useLocalDpi xmlns:a14="http://schemas.microsoft.com/office/drawing/2010/main" val="0"/>
+              </a:ext>
+            </a:extLst>
+          </a:blip>
+          <a:stretch>
+            <a:fillRect/>
+          </a:stretch>
+        </p:blipFill>
         <p:spPr>
           <a:xfrm>
-            <a:off x="960120" y="2587752"/>
-            <a:ext cx="10268712" cy="3258102"/>
+            <a:off x="930673" y="2264989"/>
+            <a:ext cx="3979655" cy="3952189"/>
           </a:xfrm>
+          <a:prstGeom prst="rect">
+            <a:avLst/>
+          </a:prstGeom>
         </p:spPr>
-        <p:txBody>
-          <a:bodyPr>
-            <a:normAutofit/>
-          </a:bodyPr>
-          <a:lstStyle/>
-          <a:p>
-            <a:pPr>
-              <a:lnSpc>
-                <a:spcPct val="91000"/>
-              </a:lnSpc>
-              <a:spcAft>
-                <a:spcPts val="800"/>
-              </a:spcAft>
-            </a:pPr>
-            <a:r>
-              <a:rPr lang="pt-BR" sz="1400" kern="100" dirty="0">
-                <a:effectLst/>
-                <a:latin typeface="Bahnschrift SemiBold SemiConden" panose="020B0502040204020203" pitchFamily="34" charset="0"/>
-                <a:ea typeface="Calibri" panose="020F0502020204030204" pitchFamily="34" charset="0"/>
-                <a:cs typeface="Times New Roman" panose="02020603050405020304" pitchFamily="18" charset="0"/>
-              </a:rPr>
-              <a:t>Eu desde pequeno sempre me inspirei muito no meu primo, sempre gostei do jeito dele e do jeito dele de encantar as pessoas e nunca se deixar abalar por nada nem ninguém, e do jeito que ele sempre seguiu seus ideais não importa oque as pessoas falavam para ele e do jeito que a gente se ajudava sempre, então desde pequeno eu queria me ver daquele jeito e conquistar um sorriso no rosto das pessoas com a mesma facilidade que ele conseguia. </a:t>
-            </a:r>
-            <a:endParaRPr lang="pt-BR" sz="1400" kern="100" dirty="0">
-              <a:effectLst/>
-              <a:latin typeface="Calibri" panose="020F0502020204030204" pitchFamily="34" charset="0"/>
-              <a:ea typeface="Calibri" panose="020F0502020204030204" pitchFamily="34" charset="0"/>
-              <a:cs typeface="Times New Roman" panose="02020603050405020304" pitchFamily="18" charset="0"/>
-            </a:endParaRPr>
-          </a:p>
-          <a:p>
-            <a:pPr>
-              <a:lnSpc>
-                <a:spcPct val="91000"/>
-              </a:lnSpc>
-              <a:spcAft>
-                <a:spcPts val="800"/>
-              </a:spcAft>
-            </a:pPr>
-            <a:r>
-              <a:rPr lang="pt-BR" sz="1400" kern="100" dirty="0">
-                <a:effectLst/>
-                <a:latin typeface="Bahnschrift SemiBold SemiConden" panose="020B0502040204020203" pitchFamily="34" charset="0"/>
-                <a:ea typeface="Calibri" panose="020F0502020204030204" pitchFamily="34" charset="0"/>
-                <a:cs typeface="Times New Roman" panose="02020603050405020304" pitchFamily="18" charset="0"/>
-              </a:rPr>
-              <a:t>Então por eu me inspirar bastante nele sempre gostava de ficar grudado com ele e conversar, brincar e assistir filmes. E com isso ele por ser um pouco mais velho que eu, me apresentou um filme da franquia “Velozes &amp; Furiosos”. Oque para mim na época foi basicamente amor à primeira vista, ainda consigo me lembrar daquela tarde em que eu assisti pela primeira vez o 6</a:t>
-            </a:r>
-            <a:r>
-              <a:rPr lang="pt-BR" sz="1400" kern="100" dirty="0">
-                <a:effectLst/>
-                <a:latin typeface="Arial" panose="020B0604020202020204" pitchFamily="34" charset="0"/>
-                <a:ea typeface="Calibri" panose="020F0502020204030204" pitchFamily="34" charset="0"/>
-                <a:cs typeface="Times New Roman" panose="02020603050405020304" pitchFamily="18" charset="0"/>
-              </a:rPr>
-              <a:t>°</a:t>
-            </a:r>
-            <a:r>
-              <a:rPr lang="pt-BR" sz="1400" kern="100" dirty="0">
-                <a:effectLst/>
-                <a:latin typeface="Bahnschrift SemiBold SemiConden" panose="020B0502040204020203" pitchFamily="34" charset="0"/>
-                <a:ea typeface="Calibri" panose="020F0502020204030204" pitchFamily="34" charset="0"/>
-                <a:cs typeface="Times New Roman" panose="02020603050405020304" pitchFamily="18" charset="0"/>
-              </a:rPr>
-              <a:t> filme da franquia e desde então nunca deixei de assistir nenhum filme da série.</a:t>
-            </a:r>
-            <a:endParaRPr lang="pt-BR" sz="1400" kern="100" dirty="0">
-              <a:effectLst/>
-              <a:latin typeface="Calibri" panose="020F0502020204030204" pitchFamily="34" charset="0"/>
-              <a:ea typeface="Calibri" panose="020F0502020204030204" pitchFamily="34" charset="0"/>
-              <a:cs typeface="Times New Roman" panose="02020603050405020304" pitchFamily="18" charset="0"/>
-            </a:endParaRPr>
-          </a:p>
-          <a:p>
-            <a:pPr>
-              <a:lnSpc>
-                <a:spcPct val="91000"/>
-              </a:lnSpc>
-            </a:pPr>
-            <a:r>
-              <a:rPr lang="pt-BR" sz="1400" dirty="0">
-                <a:effectLst/>
-                <a:latin typeface="Bahnschrift SemiBold SemiConden" panose="020B0502040204020203" pitchFamily="34" charset="0"/>
-                <a:ea typeface="Calibri" panose="020F0502020204030204" pitchFamily="34" charset="0"/>
-                <a:cs typeface="Times New Roman" panose="02020603050405020304" pitchFamily="18" charset="0"/>
-              </a:rPr>
-              <a:t>Porém não é só por esses motivos que a franquia me encanta, também tem seus valores que eu considero um ponto muito importante a se sitar pois o filme não se trata somente de corridas, pois por detrás dessas corridas eles tem um motivo muito importante para estar correndo que é para proteger suas famílias e amigos, que de acordo com eles são as coisas mais importante que eles levam para a vida.</a:t>
-            </a:r>
-            <a:br>
-              <a:rPr lang="pt-BR" sz="1400" dirty="0">
-                <a:effectLst/>
-                <a:latin typeface="Bahnschrift SemiBold SemiConden" panose="020B0502040204020203" pitchFamily="34" charset="0"/>
-                <a:ea typeface="Calibri" panose="020F0502020204030204" pitchFamily="34" charset="0"/>
-                <a:cs typeface="Times New Roman" panose="02020603050405020304" pitchFamily="18" charset="0"/>
-              </a:rPr>
-            </a:br>
-            <a:endParaRPr lang="pt-BR" sz="1400" dirty="0"/>
-          </a:p>
-        </p:txBody>
-      </p:sp>
+      </p:pic>
+      <p:pic>
+        <p:nvPicPr>
+          <p:cNvPr id="4" name="Imagem 3" descr="Uma imagem contendo Texto&#10;&#10;Descrição gerada automaticamente">
+            <a:extLst>
+              <a:ext uri="{FF2B5EF4-FFF2-40B4-BE49-F238E27FC236}">
+                <a16:creationId xmlns:a16="http://schemas.microsoft.com/office/drawing/2014/main" id="{7E539D79-FE71-2E76-3A04-81952A64B17A}"/>
+              </a:ext>
+            </a:extLst>
+          </p:cNvPr>
+          <p:cNvPicPr>
+            <a:picLocks noChangeAspect="1"/>
+          </p:cNvPicPr>
+          <p:nvPr/>
+        </p:nvPicPr>
+        <p:blipFill>
+          <a:blip r:embed="rId3">
+            <a:extLst>
+              <a:ext uri="{28A0092B-C50C-407E-A947-70E740481C1C}">
+                <a14:useLocalDpi xmlns:a14="http://schemas.microsoft.com/office/drawing/2010/main" val="0"/>
+              </a:ext>
+            </a:extLst>
+          </a:blip>
+          <a:stretch>
+            <a:fillRect/>
+          </a:stretch>
+        </p:blipFill>
+        <p:spPr>
+          <a:xfrm>
+            <a:off x="7119027" y="2265731"/>
+            <a:ext cx="3904488" cy="3961997"/>
+          </a:xfrm>
+          <a:prstGeom prst="rect">
+            <a:avLst/>
+          </a:prstGeom>
+        </p:spPr>
+      </p:pic>
     </p:spTree>
     <p:extLst>
       <p:ext uri="{BB962C8B-B14F-4D97-AF65-F5344CB8AC3E}">
-        <p14:creationId xmlns:p14="http://schemas.microsoft.com/office/powerpoint/2010/main" val="3049368475"/>
+        <p14:creationId xmlns:p14="http://schemas.microsoft.com/office/powerpoint/2010/main" val="765220912"/>
       </p:ext>
     </p:extLst>
   </p:cSld>
@@ -11080,10 +10608,10 @@
       </p:grpSpPr>
       <p:sp>
         <p:nvSpPr>
-          <p:cNvPr id="10" name="Rectangle 9">
+          <p:cNvPr id="7" name="Rectangle 6">
             <a:extLst>
               <a:ext uri="{FF2B5EF4-FFF2-40B4-BE49-F238E27FC236}">
-                <a16:creationId xmlns:a16="http://schemas.microsoft.com/office/drawing/2014/main" id="{EB6D1D7F-141C-4D8E-BFBA-D95B68E16385}"/>
+                <a16:creationId xmlns:a16="http://schemas.microsoft.com/office/drawing/2014/main" id="{09A1C012-8297-4361-ACE8-A2509FB18911}"/>
               </a:ext>
               <a:ext uri="{C183D7F6-B498-43B3-948B-1728B52AA6E4}">
                 <adec:decorative xmlns:adec="http://schemas.microsoft.com/office/drawing/2017/decorative" val="1"/>
@@ -11103,8 +10631,8 @@
         </p:nvSpPr>
         <p:spPr>
           <a:xfrm>
-            <a:off x="1524" y="0"/>
-            <a:ext cx="12188952" cy="6858000"/>
+            <a:off x="0" y="4206240"/>
+            <a:ext cx="12192000" cy="2651760"/>
           </a:xfrm>
           <a:prstGeom prst="rect">
             <a:avLst/>
@@ -11141,53 +10669,12 @@
           </a:p>
         </p:txBody>
       </p:sp>
-      <p:sp>
+      <p:sp useBgFill="1">
         <p:nvSpPr>
-          <p:cNvPr id="2" name="Título 1">
+          <p:cNvPr id="9" name="Rectangle 8">
             <a:extLst>
               <a:ext uri="{FF2B5EF4-FFF2-40B4-BE49-F238E27FC236}">
-                <a16:creationId xmlns:a16="http://schemas.microsoft.com/office/drawing/2014/main" id="{923AD84C-BB9D-9A17-5C82-B6D6590A960F}"/>
-              </a:ext>
-            </a:extLst>
-          </p:cNvPr>
-          <p:cNvSpPr>
-            <a:spLocks noGrp="1"/>
-          </p:cNvSpPr>
-          <p:nvPr>
-            <p:ph type="title"/>
-          </p:nvPr>
-        </p:nvSpPr>
-        <p:spPr>
-          <a:xfrm>
-            <a:off x="4169664" y="329034"/>
-            <a:ext cx="3377029" cy="1700784"/>
-          </a:xfrm>
-        </p:spPr>
-        <p:txBody>
-          <a:bodyPr>
-            <a:normAutofit/>
-          </a:bodyPr>
-          <a:lstStyle/>
-          <a:p>
-            <a:r>
-              <a:rPr lang="pt-BR" kern="100" dirty="0">
-                <a:effectLst/>
-                <a:latin typeface="PaybAck"/>
-                <a:ea typeface="Calibri" panose="020F0502020204030204" pitchFamily="34" charset="0"/>
-                <a:cs typeface="Times New Roman" panose="02020603050405020304" pitchFamily="18" charset="0"/>
-              </a:rPr>
-              <a:t>Valores</a:t>
-            </a:r>
-            <a:endParaRPr lang="pt-BR" dirty="0"/>
-          </a:p>
-        </p:txBody>
-      </p:sp>
-      <p:sp>
-        <p:nvSpPr>
-          <p:cNvPr id="12" name="Rectangle 11">
-            <a:extLst>
-              <a:ext uri="{FF2B5EF4-FFF2-40B4-BE49-F238E27FC236}">
-                <a16:creationId xmlns:a16="http://schemas.microsoft.com/office/drawing/2014/main" id="{27248369-464E-49D1-91FC-BC34A50A66D2}"/>
+                <a16:creationId xmlns:a16="http://schemas.microsoft.com/office/drawing/2014/main" id="{4AA13AD3-0A4F-475A-BEBB-DEEFF5C096C3}"/>
               </a:ext>
               <a:ext uri="{C183D7F6-B498-43B3-948B-1728B52AA6E4}">
                 <adec:decorative xmlns:adec="http://schemas.microsoft.com/office/drawing/2017/decorative" val="1"/>
@@ -11207,14 +10694,74 @@
         </p:nvSpPr>
         <p:spPr>
           <a:xfrm>
-            <a:off x="1524" y="2264989"/>
-            <a:ext cx="12188952" cy="3952189"/>
+            <a:off x="0" y="0"/>
+            <a:ext cx="12192000" cy="6858000"/>
+          </a:xfrm>
+          <a:prstGeom prst="rect">
+            <a:avLst/>
+          </a:prstGeom>
+          <a:ln>
+            <a:noFill/>
+          </a:ln>
+        </p:spPr>
+        <p:style>
+          <a:lnRef idx="2">
+            <a:schemeClr val="accent1">
+              <a:shade val="50000"/>
+            </a:schemeClr>
+          </a:lnRef>
+          <a:fillRef idx="1">
+            <a:schemeClr val="accent1"/>
+          </a:fillRef>
+          <a:effectRef idx="0">
+            <a:schemeClr val="accent1"/>
+          </a:effectRef>
+          <a:fontRef idx="minor">
+            <a:schemeClr val="lt1"/>
+          </a:fontRef>
+        </p:style>
+        <p:txBody>
+          <a:bodyPr rtlCol="0" anchor="ctr"/>
+          <a:lstStyle/>
+          <a:p>
+            <a:pPr algn="ctr"/>
+            <a:endParaRPr lang="en-US"/>
+          </a:p>
+        </p:txBody>
+      </p:sp>
+      <p:sp>
+        <p:nvSpPr>
+          <p:cNvPr id="11" name="Rectangle 10">
+            <a:extLst>
+              <a:ext uri="{FF2B5EF4-FFF2-40B4-BE49-F238E27FC236}">
+                <a16:creationId xmlns:a16="http://schemas.microsoft.com/office/drawing/2014/main" id="{205BB74C-33FB-4335-8808-49E247F7BF75}"/>
+              </a:ext>
+              <a:ext uri="{C183D7F6-B498-43B3-948B-1728B52AA6E4}">
+                <adec:decorative xmlns:adec="http://schemas.microsoft.com/office/drawing/2017/decorative" val="1"/>
+              </a:ext>
+            </a:extLst>
+          </p:cNvPr>
+          <p:cNvSpPr>
+            <a:spLocks noGrp="1" noRot="1" noChangeAspect="1" noMove="1" noResize="1" noEditPoints="1" noAdjustHandles="1" noChangeArrowheads="1" noChangeShapeType="1" noTextEdit="1"/>
+          </p:cNvSpPr>
+          <p:nvPr>
+            <p:extLst>
+              <p:ext uri="{386F3935-93C4-4BCD-93E2-E3B085C9AB24}">
+                <p16:designElem xmlns:p16="http://schemas.microsoft.com/office/powerpoint/2015/main" val="1"/>
+              </p:ext>
+            </p:extLst>
+          </p:nvPr>
+        </p:nvSpPr>
+        <p:spPr>
+          <a:xfrm>
+            <a:off x="1" y="1225106"/>
+            <a:ext cx="12192000" cy="3788958"/>
           </a:xfrm>
           <a:prstGeom prst="rect">
             <a:avLst/>
           </a:prstGeom>
           <a:solidFill>
-            <a:schemeClr val="bg1"/>
+            <a:schemeClr val="tx1"/>
           </a:solidFill>
           <a:ln>
             <a:noFill/>
@@ -11241,92 +10788,204 @@
           <a:lstStyle/>
           <a:p>
             <a:pPr algn="ctr"/>
-            <a:endParaRPr lang="en-US" dirty="0"/>
+            <a:endParaRPr lang="en-US"/>
           </a:p>
         </p:txBody>
       </p:sp>
-      <p:pic>
-        <p:nvPicPr>
-          <p:cNvPr id="6" name="Imagem 5" descr="Desenho de uma placa&#10;&#10;Descrição gerada automaticamente com confiança média">
+      <p:sp>
+        <p:nvSpPr>
+          <p:cNvPr id="2" name="Título 1">
             <a:extLst>
               <a:ext uri="{FF2B5EF4-FFF2-40B4-BE49-F238E27FC236}">
-                <a16:creationId xmlns:a16="http://schemas.microsoft.com/office/drawing/2014/main" id="{32A796F3-BBEF-0058-9FCD-5D3EBDBA4C1A}"/>
+                <a16:creationId xmlns:a16="http://schemas.microsoft.com/office/drawing/2014/main" id="{B1231A39-8C64-0AA0-34D0-B3DBC291B921}"/>
               </a:ext>
             </a:extLst>
           </p:cNvPr>
-          <p:cNvPicPr>
-            <a:picLocks noChangeAspect="1"/>
-          </p:cNvPicPr>
-          <p:nvPr/>
-        </p:nvPicPr>
-        <p:blipFill>
-          <a:blip r:embed="rId2">
-            <a:extLst>
-              <a:ext uri="{28A0092B-C50C-407E-A947-70E740481C1C}">
-                <a14:useLocalDpi xmlns:a14="http://schemas.microsoft.com/office/drawing/2010/main" val="0"/>
-              </a:ext>
-            </a:extLst>
-          </a:blip>
-          <a:stretch>
-            <a:fillRect/>
-          </a:stretch>
-        </p:blipFill>
+          <p:cNvSpPr>
+            <a:spLocks noGrp="1"/>
+          </p:cNvSpPr>
+          <p:nvPr>
+            <p:ph type="title"/>
+          </p:nvPr>
+        </p:nvSpPr>
         <p:spPr>
           <a:xfrm>
-            <a:off x="930673" y="2264989"/>
-            <a:ext cx="3979655" cy="3952189"/>
+            <a:off x="950976" y="1841412"/>
+            <a:ext cx="10268712" cy="2688020"/>
           </a:xfrm>
-          <a:prstGeom prst="rect">
-            <a:avLst/>
-          </a:prstGeom>
         </p:spPr>
-      </p:pic>
-      <p:pic>
-        <p:nvPicPr>
-          <p:cNvPr id="4" name="Imagem 3" descr="Uma imagem contendo Texto&#10;&#10;Descrição gerada automaticamente">
-            <a:extLst>
-              <a:ext uri="{FF2B5EF4-FFF2-40B4-BE49-F238E27FC236}">
-                <a16:creationId xmlns:a16="http://schemas.microsoft.com/office/drawing/2014/main" id="{7E539D79-FE71-2E76-3A04-81952A64B17A}"/>
-              </a:ext>
-            </a:extLst>
-          </p:cNvPr>
-          <p:cNvPicPr>
-            <a:picLocks noChangeAspect="1"/>
-          </p:cNvPicPr>
-          <p:nvPr/>
-        </p:nvPicPr>
-        <p:blipFill>
-          <a:blip r:embed="rId3">
-            <a:extLst>
-              <a:ext uri="{28A0092B-C50C-407E-A947-70E740481C1C}">
-                <a14:useLocalDpi xmlns:a14="http://schemas.microsoft.com/office/drawing/2010/main" val="0"/>
-              </a:ext>
-            </a:extLst>
-          </a:blip>
-          <a:stretch>
-            <a:fillRect/>
-          </a:stretch>
-        </p:blipFill>
-        <p:spPr>
-          <a:xfrm>
-            <a:off x="7119027" y="2265731"/>
-            <a:ext cx="3904488" cy="3961997"/>
-          </a:xfrm>
-          <a:prstGeom prst="rect">
-            <a:avLst/>
-          </a:prstGeom>
-        </p:spPr>
-      </p:pic>
+        <p:txBody>
+          <a:bodyPr vert="horz" lIns="91440" tIns="45720" rIns="91440" bIns="45720" rtlCol="0" anchor="b">
+            <a:normAutofit/>
+          </a:bodyPr>
+          <a:lstStyle/>
+          <a:p>
+            <a:r>
+              <a:rPr lang="en-US" sz="8800" dirty="0" err="1">
+                <a:effectLst/>
+              </a:rPr>
+              <a:t>Porque</a:t>
+            </a:r>
+            <a:r>
+              <a:rPr lang="en-US" sz="8800" dirty="0">
+                <a:effectLst/>
+              </a:rPr>
+              <a:t> </a:t>
+            </a:r>
+            <a:r>
+              <a:rPr lang="en-US" sz="8800" dirty="0" err="1">
+                <a:effectLst/>
+              </a:rPr>
+              <a:t>eu</a:t>
+            </a:r>
+            <a:r>
+              <a:rPr lang="en-US" sz="8800" dirty="0">
+                <a:effectLst/>
+              </a:rPr>
+              <a:t> </a:t>
+            </a:r>
+            <a:r>
+              <a:rPr lang="en-US" sz="8800" dirty="0" err="1">
+                <a:effectLst/>
+              </a:rPr>
+              <a:t>escolhi</a:t>
+            </a:r>
+            <a:r>
+              <a:rPr lang="en-US" sz="8800" dirty="0">
+                <a:effectLst/>
+              </a:rPr>
+              <a:t> </a:t>
+            </a:r>
+            <a:r>
+              <a:rPr lang="en-US" sz="8800" dirty="0" err="1">
+                <a:effectLst/>
+              </a:rPr>
+              <a:t>esse</a:t>
+            </a:r>
+            <a:r>
+              <a:rPr lang="en-US" sz="8800" dirty="0">
+                <a:effectLst/>
+              </a:rPr>
+              <a:t> </a:t>
+            </a:r>
+            <a:r>
+              <a:rPr lang="en-US" sz="8800" dirty="0" err="1">
+                <a:effectLst/>
+              </a:rPr>
+              <a:t>tema</a:t>
+            </a:r>
+            <a:r>
+              <a:rPr lang="en-US" sz="8800" dirty="0">
+                <a:effectLst/>
+              </a:rPr>
+              <a:t> ?</a:t>
+            </a:r>
+            <a:endParaRPr lang="en-US" sz="8800" dirty="0"/>
+          </a:p>
+        </p:txBody>
+      </p:sp>
     </p:spTree>
     <p:extLst>
       <p:ext uri="{BB962C8B-B14F-4D97-AF65-F5344CB8AC3E}">
-        <p14:creationId xmlns:p14="http://schemas.microsoft.com/office/powerpoint/2010/main" val="765220912"/>
+        <p14:creationId xmlns:p14="http://schemas.microsoft.com/office/powerpoint/2010/main" val="3994563989"/>
       </p:ext>
     </p:extLst>
   </p:cSld>
   <p:clrMapOvr>
     <a:masterClrMapping/>
   </p:clrMapOvr>
+  <p:timing>
+    <p:tnLst>
+      <p:par>
+        <p:cTn id="1" dur="indefinite" restart="never" nodeType="tmRoot">
+          <p:childTnLst>
+            <p:seq concurrent="1" nextAc="seek">
+              <p:cTn id="2" dur="indefinite" nodeType="mainSeq">
+                <p:childTnLst>
+                  <p:par>
+                    <p:cTn id="3" fill="hold">
+                      <p:stCondLst>
+                        <p:cond delay="indefinite"/>
+                        <p:cond evt="onBegin" delay="0">
+                          <p:tn val="2"/>
+                        </p:cond>
+                      </p:stCondLst>
+                      <p:childTnLst>
+                        <p:par>
+                          <p:cTn id="4" fill="hold">
+                            <p:stCondLst>
+                              <p:cond delay="0"/>
+                            </p:stCondLst>
+                            <p:childTnLst>
+                              <p:par>
+                                <p:cTn id="5" presetID="10" presetClass="entr" presetSubtype="0" fill="hold" grpId="0" nodeType="withEffect">
+                                  <p:stCondLst>
+                                    <p:cond delay="0"/>
+                                  </p:stCondLst>
+                                  <p:iterate>
+                                    <p:tmPct val="10000"/>
+                                  </p:iterate>
+                                  <p:childTnLst>
+                                    <p:set>
+                                      <p:cBhvr>
+                                        <p:cTn id="6" dur="1" fill="hold">
+                                          <p:stCondLst>
+                                            <p:cond delay="0"/>
+                                          </p:stCondLst>
+                                        </p:cTn>
+                                        <p:tgtEl>
+                                          <p:spTgt spid="2"/>
+                                        </p:tgtEl>
+                                        <p:attrNameLst>
+                                          <p:attrName>style.visibility</p:attrName>
+                                        </p:attrNameLst>
+                                      </p:cBhvr>
+                                      <p:to>
+                                        <p:strVal val="visible"/>
+                                      </p:to>
+                                    </p:set>
+                                    <p:animEffect transition="in" filter="fade">
+                                      <p:cBhvr>
+                                        <p:cTn id="7" dur="700"/>
+                                        <p:tgtEl>
+                                          <p:spTgt spid="2"/>
+                                        </p:tgtEl>
+                                      </p:cBhvr>
+                                    </p:animEffect>
+                                  </p:childTnLst>
+                                </p:cTn>
+                              </p:par>
+                            </p:childTnLst>
+                          </p:cTn>
+                        </p:par>
+                      </p:childTnLst>
+                    </p:cTn>
+                  </p:par>
+                </p:childTnLst>
+              </p:cTn>
+              <p:prevCondLst>
+                <p:cond evt="onPrev" delay="0">
+                  <p:tgtEl>
+                    <p:sldTgt/>
+                  </p:tgtEl>
+                </p:cond>
+              </p:prevCondLst>
+              <p:nextCondLst>
+                <p:cond evt="onNext" delay="0">
+                  <p:tgtEl>
+                    <p:sldTgt/>
+                  </p:tgtEl>
+                </p:cond>
+              </p:nextCondLst>
+            </p:seq>
+          </p:childTnLst>
+        </p:cTn>
+      </p:par>
+    </p:tnLst>
+    <p:bldLst>
+      <p:bldP spid="2" grpId="0"/>
+    </p:bldLst>
+  </p:timing>
 </p:sld>
 </file>
 
@@ -12027,19 +11686,17 @@
       </p:sp>
       <p:pic>
         <p:nvPicPr>
-          <p:cNvPr id="5" name="Espaço Reservado para Conteúdo 4" descr="Diagrama&#10;&#10;Descrição gerada automaticamente">
+          <p:cNvPr id="4" name="Imagem 3" descr="Diagrama&#10;&#10;Descrição gerada automaticamente">
             <a:extLst>
               <a:ext uri="{FF2B5EF4-FFF2-40B4-BE49-F238E27FC236}">
-                <a16:creationId xmlns:a16="http://schemas.microsoft.com/office/drawing/2014/main" id="{F229E0DB-0246-726B-4A62-9C6E8F1FF992}"/>
+                <a16:creationId xmlns:a16="http://schemas.microsoft.com/office/drawing/2014/main" id="{18480198-0F88-20AC-B116-6F8857670BFC}"/>
               </a:ext>
             </a:extLst>
           </p:cNvPr>
           <p:cNvPicPr>
-            <a:picLocks noGrp="1" noChangeAspect="1"/>
+            <a:picLocks noChangeAspect="1"/>
           </p:cNvPicPr>
-          <p:nvPr>
-            <p:ph idx="1"/>
-          </p:nvPr>
+          <p:nvPr/>
         </p:nvPicPr>
         <p:blipFill>
           <a:blip r:embed="rId2">
@@ -12055,9 +11712,12 @@
         </p:blipFill>
         <p:spPr>
           <a:xfrm>
-            <a:off x="0" y="0"/>
-            <a:ext cx="12192000" cy="7493349"/>
+            <a:off x="-925287" y="0"/>
+            <a:ext cx="14042573" cy="6858000"/>
           </a:xfrm>
+          <a:prstGeom prst="rect">
+            <a:avLst/>
+          </a:prstGeom>
         </p:spPr>
       </p:pic>
     </p:spTree>

</xml_diff>